<commit_message>
Update buoi 5 OOP - truu tuong va da hinh
</commit_message>
<xml_diff>
--- a/hocbe/tai-lieu/be/Bai2-ClassVaOOP.pptx
+++ b/hocbe/tai-lieu/be/Bai2-ClassVaOOP.pptx
@@ -11,9 +11,10 @@
     <p:sldId id="281" r:id="rId5"/>
     <p:sldId id="282" r:id="rId6"/>
     <p:sldId id="286" r:id="rId7"/>
-    <p:sldId id="283" r:id="rId8"/>
-    <p:sldId id="284" r:id="rId9"/>
-    <p:sldId id="285" r:id="rId10"/>
+    <p:sldId id="287" r:id="rId8"/>
+    <p:sldId id="283" r:id="rId9"/>
+    <p:sldId id="284" r:id="rId10"/>
+    <p:sldId id="285" r:id="rId11"/>
   </p:sldIdLst>
   <p:sldSz cx="9144000" cy="6858000" type="screen4x3"/>
   <p:notesSz cx="6858000" cy="9144000"/>
@@ -127,6 +128,7 @@
             <p14:sldId id="281"/>
             <p14:sldId id="282"/>
             <p14:sldId id="286"/>
+            <p14:sldId id="287"/>
             <p14:sldId id="283"/>
             <p14:sldId id="284"/>
             <p14:sldId id="285"/>
@@ -331,7 +333,7 @@
           <a:p>
             <a:fld id="{7109C2E1-7128-4CF3-932E-985565988C28}" type="datetimeFigureOut">
               <a:rPr lang="en-US" smtClean="0"/>
-              <a:t>9/10/2020</a:t>
+              <a:t>12/13/2021</a:t>
             </a:fld>
             <a:endParaRPr lang="en-US"/>
           </a:p>
@@ -499,7 +501,7 @@
           <a:p>
             <a:fld id="{7109C2E1-7128-4CF3-932E-985565988C28}" type="datetimeFigureOut">
               <a:rPr lang="en-US" smtClean="0"/>
-              <a:t>9/10/2020</a:t>
+              <a:t>12/13/2021</a:t>
             </a:fld>
             <a:endParaRPr lang="en-US"/>
           </a:p>
@@ -677,7 +679,7 @@
           <a:p>
             <a:fld id="{7109C2E1-7128-4CF3-932E-985565988C28}" type="datetimeFigureOut">
               <a:rPr lang="en-US" smtClean="0"/>
-              <a:t>9/10/2020</a:t>
+              <a:t>12/13/2021</a:t>
             </a:fld>
             <a:endParaRPr lang="en-US"/>
           </a:p>
@@ -845,7 +847,7 @@
           <a:p>
             <a:fld id="{7109C2E1-7128-4CF3-932E-985565988C28}" type="datetimeFigureOut">
               <a:rPr lang="en-US" smtClean="0"/>
-              <a:t>9/10/2020</a:t>
+              <a:t>12/13/2021</a:t>
             </a:fld>
             <a:endParaRPr lang="en-US"/>
           </a:p>
@@ -1090,7 +1092,7 @@
           <a:p>
             <a:fld id="{7109C2E1-7128-4CF3-932E-985565988C28}" type="datetimeFigureOut">
               <a:rPr lang="en-US" smtClean="0"/>
-              <a:t>9/10/2020</a:t>
+              <a:t>12/13/2021</a:t>
             </a:fld>
             <a:endParaRPr lang="en-US"/>
           </a:p>
@@ -1375,7 +1377,7 @@
           <a:p>
             <a:fld id="{7109C2E1-7128-4CF3-932E-985565988C28}" type="datetimeFigureOut">
               <a:rPr lang="en-US" smtClean="0"/>
-              <a:t>9/10/2020</a:t>
+              <a:t>12/13/2021</a:t>
             </a:fld>
             <a:endParaRPr lang="en-US"/>
           </a:p>
@@ -1794,7 +1796,7 @@
           <a:p>
             <a:fld id="{7109C2E1-7128-4CF3-932E-985565988C28}" type="datetimeFigureOut">
               <a:rPr lang="en-US" smtClean="0"/>
-              <a:t>9/10/2020</a:t>
+              <a:t>12/13/2021</a:t>
             </a:fld>
             <a:endParaRPr lang="en-US"/>
           </a:p>
@@ -1911,7 +1913,7 @@
           <a:p>
             <a:fld id="{7109C2E1-7128-4CF3-932E-985565988C28}" type="datetimeFigureOut">
               <a:rPr lang="en-US" smtClean="0"/>
-              <a:t>9/10/2020</a:t>
+              <a:t>12/13/2021</a:t>
             </a:fld>
             <a:endParaRPr lang="en-US"/>
           </a:p>
@@ -2006,7 +2008,7 @@
           <a:p>
             <a:fld id="{7109C2E1-7128-4CF3-932E-985565988C28}" type="datetimeFigureOut">
               <a:rPr lang="en-US" smtClean="0"/>
-              <a:t>9/10/2020</a:t>
+              <a:t>12/13/2021</a:t>
             </a:fld>
             <a:endParaRPr lang="en-US"/>
           </a:p>
@@ -2281,7 +2283,7 @@
           <a:p>
             <a:fld id="{7109C2E1-7128-4CF3-932E-985565988C28}" type="datetimeFigureOut">
               <a:rPr lang="en-US" smtClean="0"/>
-              <a:t>9/10/2020</a:t>
+              <a:t>12/13/2021</a:t>
             </a:fld>
             <a:endParaRPr lang="en-US"/>
           </a:p>
@@ -2533,7 +2535,7 @@
           <a:p>
             <a:fld id="{7109C2E1-7128-4CF3-932E-985565988C28}" type="datetimeFigureOut">
               <a:rPr lang="en-US" smtClean="0"/>
-              <a:t>9/10/2020</a:t>
+              <a:t>12/13/2021</a:t>
             </a:fld>
             <a:endParaRPr lang="en-US"/>
           </a:p>
@@ -2744,7 +2746,7 @@
           <a:p>
             <a:fld id="{7109C2E1-7128-4CF3-932E-985565988C28}" type="datetimeFigureOut">
               <a:rPr lang="en-US" smtClean="0"/>
-              <a:t>9/10/2020</a:t>
+              <a:t>12/13/2021</a:t>
             </a:fld>
             <a:endParaRPr lang="en-US"/>
           </a:p>
@@ -3456,6 +3458,305 @@
 </p:sld>
 </file>
 
+<file path=ppt/slides/slide10.xml><?xml version="1.0" encoding="utf-8"?>
+<p:sld xmlns:a="http://schemas.openxmlformats.org/drawingml/2006/main" xmlns:r="http://schemas.openxmlformats.org/officeDocument/2006/relationships" xmlns:p="http://schemas.openxmlformats.org/presentationml/2006/main">
+  <p:cSld>
+    <p:spTree>
+      <p:nvGrpSpPr>
+        <p:cNvPr id="1" name=""/>
+        <p:cNvGrpSpPr/>
+        <p:nvPr/>
+      </p:nvGrpSpPr>
+      <p:grpSpPr>
+        <a:xfrm>
+          <a:off x="0" y="0"/>
+          <a:ext cx="0" cy="0"/>
+          <a:chOff x="0" y="0"/>
+          <a:chExt cx="0" cy="0"/>
+        </a:xfrm>
+      </p:grpSpPr>
+      <p:sp>
+        <p:nvSpPr>
+          <p:cNvPr id="4" name="Title 1"/>
+          <p:cNvSpPr txBox="1">
+            <a:spLocks/>
+          </p:cNvSpPr>
+          <p:nvPr/>
+        </p:nvSpPr>
+        <p:spPr>
+          <a:xfrm>
+            <a:off x="4800600" y="17991"/>
+            <a:ext cx="4267200" cy="762000"/>
+          </a:xfrm>
+          <a:prstGeom prst="rect">
+            <a:avLst/>
+          </a:prstGeom>
+        </p:spPr>
+        <p:txBody>
+          <a:bodyPr vert="horz" lIns="91440" tIns="45720" rIns="91440" bIns="45720" rtlCol="0" anchor="ctr">
+            <a:normAutofit/>
+          </a:bodyPr>
+          <a:lstStyle>
+            <a:lvl1pPr algn="ctr" defTabSz="914400" rtl="0" eaLnBrk="1" latinLnBrk="0" hangingPunct="1">
+              <a:spcBef>
+                <a:spcPct val="0"/>
+              </a:spcBef>
+              <a:buNone/>
+              <a:defRPr sz="4400" kern="1200">
+                <a:solidFill>
+                  <a:schemeClr val="tx1"/>
+                </a:solidFill>
+                <a:latin typeface="+mj-lt"/>
+                <a:ea typeface="+mj-ea"/>
+                <a:cs typeface="+mj-cs"/>
+              </a:defRPr>
+            </a:lvl1pPr>
+          </a:lstStyle>
+          <a:p>
+            <a:r>
+              <a:rPr lang="en-US" sz="2000" b="1" dirty="0">
+                <a:solidFill>
+                  <a:srgbClr val="FF0000"/>
+                </a:solidFill>
+                <a:latin typeface="Arial" panose="020B0604020202020204" pitchFamily="34" charset="0"/>
+                <a:cs typeface="Arial" panose="020B0604020202020204" pitchFamily="34" charset="0"/>
+              </a:rPr>
+              <a:t>KHÓA HỌC JAVA WEB - FE</a:t>
+            </a:r>
+          </a:p>
+          <a:p>
+            <a:r>
+              <a:rPr lang="en-US" sz="1200" b="1" i="1" u="sng" dirty="0" err="1">
+                <a:solidFill>
+                  <a:srgbClr val="FF0000"/>
+                </a:solidFill>
+                <a:latin typeface="Arial" panose="020B0604020202020204" pitchFamily="34" charset="0"/>
+                <a:cs typeface="Arial" panose="020B0604020202020204" pitchFamily="34" charset="0"/>
+              </a:rPr>
+              <a:t>Biên</a:t>
+            </a:r>
+            <a:r>
+              <a:rPr lang="en-US" sz="1200" b="1" i="1" u="sng" dirty="0">
+                <a:solidFill>
+                  <a:srgbClr val="FF0000"/>
+                </a:solidFill>
+                <a:latin typeface="Arial" panose="020B0604020202020204" pitchFamily="34" charset="0"/>
+                <a:cs typeface="Arial" panose="020B0604020202020204" pitchFamily="34" charset="0"/>
+              </a:rPr>
+              <a:t> </a:t>
+            </a:r>
+            <a:r>
+              <a:rPr lang="en-US" sz="1200" b="1" i="1" u="sng" dirty="0" err="1">
+                <a:solidFill>
+                  <a:srgbClr val="FF0000"/>
+                </a:solidFill>
+                <a:latin typeface="Arial" panose="020B0604020202020204" pitchFamily="34" charset="0"/>
+                <a:cs typeface="Arial" panose="020B0604020202020204" pitchFamily="34" charset="0"/>
+              </a:rPr>
+              <a:t>soạn</a:t>
+            </a:r>
+            <a:r>
+              <a:rPr lang="en-US" sz="1200" b="1" i="1" u="sng" dirty="0">
+                <a:solidFill>
+                  <a:srgbClr val="FF0000"/>
+                </a:solidFill>
+                <a:latin typeface="Arial" panose="020B0604020202020204" pitchFamily="34" charset="0"/>
+                <a:cs typeface="Arial" panose="020B0604020202020204" pitchFamily="34" charset="0"/>
+              </a:rPr>
+              <a:t>:</a:t>
+            </a:r>
+            <a:r>
+              <a:rPr lang="en-US" sz="1200" b="1" i="1" dirty="0">
+                <a:solidFill>
+                  <a:srgbClr val="FF0000"/>
+                </a:solidFill>
+                <a:latin typeface="Arial" panose="020B0604020202020204" pitchFamily="34" charset="0"/>
+                <a:cs typeface="Arial" panose="020B0604020202020204" pitchFamily="34" charset="0"/>
+              </a:rPr>
+              <a:t> T3H</a:t>
+            </a:r>
+          </a:p>
+        </p:txBody>
+      </p:sp>
+      <p:pic>
+        <p:nvPicPr>
+          <p:cNvPr id="5" name="Picture 5" descr="C:\Users\Admin\Desktop\tải xuống.png"/>
+          <p:cNvPicPr>
+            <a:picLocks noChangeAspect="1" noChangeArrowheads="1"/>
+          </p:cNvPicPr>
+          <p:nvPr/>
+        </p:nvPicPr>
+        <p:blipFill>
+          <a:blip r:embed="rId2">
+            <a:extLst>
+              <a:ext uri="{28A0092B-C50C-407E-A947-70E740481C1C}">
+                <a14:useLocalDpi xmlns:a14="http://schemas.microsoft.com/office/drawing/2010/main" val="0"/>
+              </a:ext>
+            </a:extLst>
+          </a:blip>
+          <a:srcRect/>
+          <a:stretch>
+            <a:fillRect/>
+          </a:stretch>
+        </p:blipFill>
+        <p:spPr bwMode="auto">
+          <a:xfrm>
+            <a:off x="23734" y="7937"/>
+            <a:ext cx="3883433" cy="772054"/>
+          </a:xfrm>
+          <a:prstGeom prst="rect">
+            <a:avLst/>
+          </a:prstGeom>
+          <a:noFill/>
+          <a:extLst>
+            <a:ext uri="{909E8E84-426E-40DD-AFC4-6F175D3DCCD1}">
+              <a14:hiddenFill xmlns:a14="http://schemas.microsoft.com/office/drawing/2010/main">
+                <a:solidFill>
+                  <a:srgbClr val="FFFFFF"/>
+                </a:solidFill>
+              </a14:hiddenFill>
+            </a:ext>
+          </a:extLst>
+        </p:spPr>
+      </p:pic>
+      <p:cxnSp>
+        <p:nvCxnSpPr>
+          <p:cNvPr id="8" name="Straight Connector 7"/>
+          <p:cNvCxnSpPr/>
+          <p:nvPr/>
+        </p:nvCxnSpPr>
+        <p:spPr>
+          <a:xfrm>
+            <a:off x="0" y="779991"/>
+            <a:ext cx="9144000" cy="0"/>
+          </a:xfrm>
+          <a:prstGeom prst="line">
+            <a:avLst/>
+          </a:prstGeom>
+          <a:ln w="6350">
+            <a:prstDash val="sysDot"/>
+          </a:ln>
+        </p:spPr>
+        <p:style>
+          <a:lnRef idx="1">
+            <a:schemeClr val="accent1"/>
+          </a:lnRef>
+          <a:fillRef idx="0">
+            <a:schemeClr val="accent1"/>
+          </a:fillRef>
+          <a:effectRef idx="0">
+            <a:schemeClr val="accent1"/>
+          </a:effectRef>
+          <a:fontRef idx="minor">
+            <a:schemeClr val="tx1"/>
+          </a:fontRef>
+        </p:style>
+      </p:cxnSp>
+      <p:sp>
+        <p:nvSpPr>
+          <p:cNvPr id="9" name="Rectangle 8"/>
+          <p:cNvSpPr/>
+          <p:nvPr/>
+        </p:nvSpPr>
+        <p:spPr>
+          <a:xfrm>
+            <a:off x="-9334" y="914400"/>
+            <a:ext cx="9153334" cy="1200329"/>
+          </a:xfrm>
+          <a:prstGeom prst="rect">
+            <a:avLst/>
+          </a:prstGeom>
+        </p:spPr>
+        <p:txBody>
+          <a:bodyPr wrap="square">
+            <a:spAutoFit/>
+          </a:bodyPr>
+          <a:lstStyle/>
+          <a:p>
+            <a:r>
+              <a:rPr lang="en-US" sz="2400" b="1" dirty="0">
+                <a:solidFill>
+                  <a:srgbClr val="FF0000"/>
+                </a:solidFill>
+                <a:latin typeface="Arial" panose="020B0604020202020204" pitchFamily="34" charset="0"/>
+                <a:cs typeface="Arial" panose="020B0604020202020204" pitchFamily="34" charset="0"/>
+              </a:rPr>
+              <a:t>IV.   </a:t>
+            </a:r>
+            <a:r>
+              <a:rPr lang="en-US" sz="2400" b="1" dirty="0" err="1">
+                <a:solidFill>
+                  <a:srgbClr val="FF0000"/>
+                </a:solidFill>
+                <a:latin typeface="Arial" panose="020B0604020202020204" pitchFamily="34" charset="0"/>
+                <a:cs typeface="Arial" panose="020B0604020202020204" pitchFamily="34" charset="0"/>
+              </a:rPr>
+              <a:t>Thực</a:t>
+            </a:r>
+            <a:r>
+              <a:rPr lang="en-US" sz="2400" b="1" dirty="0">
+                <a:solidFill>
+                  <a:srgbClr val="FF0000"/>
+                </a:solidFill>
+                <a:latin typeface="Arial" panose="020B0604020202020204" pitchFamily="34" charset="0"/>
+                <a:cs typeface="Arial" panose="020B0604020202020204" pitchFamily="34" charset="0"/>
+              </a:rPr>
+              <a:t> </a:t>
+            </a:r>
+            <a:r>
+              <a:rPr lang="en-US" sz="2400" b="1" dirty="0" err="1">
+                <a:solidFill>
+                  <a:srgbClr val="FF0000"/>
+                </a:solidFill>
+                <a:latin typeface="Arial" panose="020B0604020202020204" pitchFamily="34" charset="0"/>
+                <a:cs typeface="Arial" panose="020B0604020202020204" pitchFamily="34" charset="0"/>
+              </a:rPr>
+              <a:t>hành</a:t>
+            </a:r>
+            <a:endParaRPr lang="en-US" sz="2400" b="1" dirty="0">
+              <a:solidFill>
+                <a:srgbClr val="FF0000"/>
+              </a:solidFill>
+              <a:latin typeface="Arial" panose="020B0604020202020204" pitchFamily="34" charset="0"/>
+              <a:cs typeface="Arial" panose="020B0604020202020204" pitchFamily="34" charset="0"/>
+            </a:endParaRPr>
+          </a:p>
+          <a:p>
+            <a:endParaRPr lang="en-US" sz="2400" b="1" dirty="0">
+              <a:solidFill>
+                <a:srgbClr val="FF0000"/>
+              </a:solidFill>
+              <a:latin typeface="Arial" panose="020B0604020202020204" pitchFamily="34" charset="0"/>
+              <a:cs typeface="Arial" panose="020B0604020202020204" pitchFamily="34" charset="0"/>
+            </a:endParaRPr>
+          </a:p>
+          <a:p>
+            <a:endParaRPr lang="en-US" sz="2400" b="1" dirty="0">
+              <a:solidFill>
+                <a:srgbClr val="FF0000"/>
+              </a:solidFill>
+              <a:latin typeface="Arial" panose="020B0604020202020204" pitchFamily="34" charset="0"/>
+              <a:cs typeface="Arial" panose="020B0604020202020204" pitchFamily="34" charset="0"/>
+            </a:endParaRPr>
+          </a:p>
+        </p:txBody>
+      </p:sp>
+    </p:spTree>
+    <p:extLst>
+      <p:ext uri="{BB962C8B-B14F-4D97-AF65-F5344CB8AC3E}">
+        <p14:creationId xmlns:p14="http://schemas.microsoft.com/office/powerpoint/2010/main" val="2163069874"/>
+      </p:ext>
+    </p:extLst>
+  </p:cSld>
+  <p:clrMapOvr>
+    <a:masterClrMapping/>
+  </p:clrMapOvr>
+  <p:transition spd="slow">
+    <p:pull dir="r"/>
+  </p:transition>
+</p:sld>
+</file>
+
 <file path=ppt/slides/slide2.xml><?xml version="1.0" encoding="utf-8"?>
 <p:sld xmlns:a="http://schemas.openxmlformats.org/drawingml/2006/main" xmlns:r="http://schemas.openxmlformats.org/officeDocument/2006/relationships" xmlns:p="http://schemas.openxmlformats.org/presentationml/2006/main">
   <p:cSld>
@@ -8084,7 +8385,7 @@
               <a:t>, ổ </a:t>
             </a:r>
             <a:r>
-              <a:rPr lang="en-US" sz="2000" dirty="0" err="1">
+              <a:rPr lang="en-US" sz="2000" dirty="0" err="1" smtClean="0">
                 <a:latin typeface="Arial" panose="020B0604020202020204" pitchFamily="34" charset="0"/>
                 <a:cs typeface="Arial" panose="020B0604020202020204" pitchFamily="34" charset="0"/>
               </a:rPr>
@@ -8316,6 +8617,1602 @@
         <p:spPr>
           <a:xfrm>
             <a:off x="-9334" y="914400"/>
+            <a:ext cx="9153334" cy="5324535"/>
+          </a:xfrm>
+          <a:prstGeom prst="rect">
+            <a:avLst/>
+          </a:prstGeom>
+        </p:spPr>
+        <p:txBody>
+          <a:bodyPr wrap="square">
+            <a:spAutoFit/>
+          </a:bodyPr>
+          <a:lstStyle/>
+          <a:p>
+            <a:pPr marL="514350" indent="-514350">
+              <a:buAutoNum type="romanUcPeriod" startAt="2"/>
+            </a:pPr>
+            <a:r>
+              <a:rPr lang="en-US" sz="2400" b="1" dirty="0" err="1">
+                <a:solidFill>
+                  <a:srgbClr val="FF0000"/>
+                </a:solidFill>
+                <a:latin typeface="Arial" panose="020B0604020202020204" pitchFamily="34" charset="0"/>
+                <a:cs typeface="Arial" panose="020B0604020202020204" pitchFamily="34" charset="0"/>
+              </a:rPr>
+              <a:t>Thực</a:t>
+            </a:r>
+            <a:r>
+              <a:rPr lang="en-US" sz="2400" b="1" dirty="0">
+                <a:solidFill>
+                  <a:srgbClr val="FF0000"/>
+                </a:solidFill>
+                <a:latin typeface="Arial" panose="020B0604020202020204" pitchFamily="34" charset="0"/>
+                <a:cs typeface="Arial" panose="020B0604020202020204" pitchFamily="34" charset="0"/>
+              </a:rPr>
+              <a:t> </a:t>
+            </a:r>
+            <a:r>
+              <a:rPr lang="en-US" sz="2400" b="1" dirty="0" err="1">
+                <a:solidFill>
+                  <a:srgbClr val="FF0000"/>
+                </a:solidFill>
+                <a:latin typeface="Arial" panose="020B0604020202020204" pitchFamily="34" charset="0"/>
+                <a:cs typeface="Arial" panose="020B0604020202020204" pitchFamily="34" charset="0"/>
+              </a:rPr>
+              <a:t>hành</a:t>
+            </a:r>
+            <a:r>
+              <a:rPr lang="en-US" sz="2400" b="1" dirty="0">
+                <a:solidFill>
+                  <a:srgbClr val="FF0000"/>
+                </a:solidFill>
+                <a:latin typeface="Arial" panose="020B0604020202020204" pitchFamily="34" charset="0"/>
+                <a:cs typeface="Arial" panose="020B0604020202020204" pitchFamily="34" charset="0"/>
+              </a:rPr>
+              <a:t> </a:t>
+            </a:r>
+            <a:r>
+              <a:rPr lang="en-US" sz="2400" b="1" dirty="0" err="1">
+                <a:solidFill>
+                  <a:srgbClr val="FF0000"/>
+                </a:solidFill>
+                <a:latin typeface="Arial" panose="020B0604020202020204" pitchFamily="34" charset="0"/>
+                <a:cs typeface="Arial" panose="020B0604020202020204" pitchFamily="34" charset="0"/>
+              </a:rPr>
+              <a:t>tạo</a:t>
+            </a:r>
+            <a:r>
+              <a:rPr lang="en-US" sz="2400" b="1" dirty="0">
+                <a:solidFill>
+                  <a:srgbClr val="FF0000"/>
+                </a:solidFill>
+                <a:latin typeface="Arial" panose="020B0604020202020204" pitchFamily="34" charset="0"/>
+                <a:cs typeface="Arial" panose="020B0604020202020204" pitchFamily="34" charset="0"/>
+              </a:rPr>
+              <a:t> Object</a:t>
+            </a:r>
+          </a:p>
+          <a:p>
+            <a:endParaRPr lang="en-US" sz="2400" b="1" dirty="0">
+              <a:solidFill>
+                <a:srgbClr val="FF0000"/>
+              </a:solidFill>
+              <a:latin typeface="Arial" panose="020B0604020202020204" pitchFamily="34" charset="0"/>
+              <a:cs typeface="Arial" panose="020B0604020202020204" pitchFamily="34" charset="0"/>
+            </a:endParaRPr>
+          </a:p>
+          <a:p>
+            <a:pPr lvl="1"/>
+            <a:r>
+              <a:rPr lang="en-US" sz="2400" b="1" dirty="0" err="1">
+                <a:solidFill>
+                  <a:srgbClr val="FF0000"/>
+                </a:solidFill>
+                <a:latin typeface="Arial" panose="020B0604020202020204" pitchFamily="34" charset="0"/>
+                <a:cs typeface="Arial" panose="020B0604020202020204" pitchFamily="34" charset="0"/>
+              </a:rPr>
+              <a:t>Viết</a:t>
+            </a:r>
+            <a:r>
+              <a:rPr lang="en-US" sz="2400" b="1" dirty="0">
+                <a:solidFill>
+                  <a:srgbClr val="FF0000"/>
+                </a:solidFill>
+                <a:latin typeface="Arial" panose="020B0604020202020204" pitchFamily="34" charset="0"/>
+                <a:cs typeface="Arial" panose="020B0604020202020204" pitchFamily="34" charset="0"/>
+              </a:rPr>
+              <a:t> </a:t>
+            </a:r>
+            <a:r>
+              <a:rPr lang="en-US" sz="2400" b="1" dirty="0" err="1">
+                <a:solidFill>
+                  <a:srgbClr val="FF0000"/>
+                </a:solidFill>
+                <a:latin typeface="Arial" panose="020B0604020202020204" pitchFamily="34" charset="0"/>
+                <a:cs typeface="Arial" panose="020B0604020202020204" pitchFamily="34" charset="0"/>
+              </a:rPr>
+              <a:t>chương</a:t>
+            </a:r>
+            <a:r>
+              <a:rPr lang="en-US" sz="2400" b="1" dirty="0">
+                <a:solidFill>
+                  <a:srgbClr val="FF0000"/>
+                </a:solidFill>
+                <a:latin typeface="Arial" panose="020B0604020202020204" pitchFamily="34" charset="0"/>
+                <a:cs typeface="Arial" panose="020B0604020202020204" pitchFamily="34" charset="0"/>
+              </a:rPr>
+              <a:t> </a:t>
+            </a:r>
+            <a:r>
+              <a:rPr lang="en-US" sz="2400" b="1" dirty="0" err="1">
+                <a:solidFill>
+                  <a:srgbClr val="FF0000"/>
+                </a:solidFill>
+                <a:latin typeface="Arial" panose="020B0604020202020204" pitchFamily="34" charset="0"/>
+                <a:cs typeface="Arial" panose="020B0604020202020204" pitchFamily="34" charset="0"/>
+              </a:rPr>
+              <a:t>trình</a:t>
+            </a:r>
+            <a:r>
+              <a:rPr lang="en-US" sz="2400" b="1" dirty="0">
+                <a:solidFill>
+                  <a:srgbClr val="FF0000"/>
+                </a:solidFill>
+                <a:latin typeface="Arial" panose="020B0604020202020204" pitchFamily="34" charset="0"/>
+                <a:cs typeface="Arial" panose="020B0604020202020204" pitchFamily="34" charset="0"/>
+              </a:rPr>
+              <a:t> java </a:t>
+            </a:r>
+            <a:r>
+              <a:rPr lang="en-US" sz="2400" b="1" dirty="0" err="1">
+                <a:solidFill>
+                  <a:srgbClr val="FF0000"/>
+                </a:solidFill>
+                <a:latin typeface="Arial" panose="020B0604020202020204" pitchFamily="34" charset="0"/>
+                <a:cs typeface="Arial" panose="020B0604020202020204" pitchFamily="34" charset="0"/>
+              </a:rPr>
+              <a:t>cho</a:t>
+            </a:r>
+            <a:r>
+              <a:rPr lang="en-US" sz="2400" b="1" dirty="0">
+                <a:solidFill>
+                  <a:srgbClr val="FF0000"/>
+                </a:solidFill>
+                <a:latin typeface="Arial" panose="020B0604020202020204" pitchFamily="34" charset="0"/>
+                <a:cs typeface="Arial" panose="020B0604020202020204" pitchFamily="34" charset="0"/>
+              </a:rPr>
+              <a:t> </a:t>
+            </a:r>
+            <a:r>
+              <a:rPr lang="en-US" sz="2400" b="1" dirty="0" err="1">
+                <a:solidFill>
+                  <a:srgbClr val="FF0000"/>
+                </a:solidFill>
+                <a:latin typeface="Arial" panose="020B0604020202020204" pitchFamily="34" charset="0"/>
+                <a:cs typeface="Arial" panose="020B0604020202020204" pitchFamily="34" charset="0"/>
+              </a:rPr>
+              <a:t>phép</a:t>
+            </a:r>
+            <a:r>
+              <a:rPr lang="en-US" sz="2400" b="1" dirty="0">
+                <a:solidFill>
+                  <a:srgbClr val="FF0000"/>
+                </a:solidFill>
+                <a:latin typeface="Arial" panose="020B0604020202020204" pitchFamily="34" charset="0"/>
+                <a:cs typeface="Arial" panose="020B0604020202020204" pitchFamily="34" charset="0"/>
+              </a:rPr>
+              <a:t> </a:t>
+            </a:r>
+            <a:r>
+              <a:rPr lang="en-US" sz="2400" b="1" dirty="0" err="1">
+                <a:solidFill>
+                  <a:srgbClr val="FF0000"/>
+                </a:solidFill>
+                <a:latin typeface="Arial" panose="020B0604020202020204" pitchFamily="34" charset="0"/>
+                <a:cs typeface="Arial" panose="020B0604020202020204" pitchFamily="34" charset="0"/>
+              </a:rPr>
+              <a:t>người</a:t>
+            </a:r>
+            <a:r>
+              <a:rPr lang="en-US" sz="2400" b="1" dirty="0">
+                <a:solidFill>
+                  <a:srgbClr val="FF0000"/>
+                </a:solidFill>
+                <a:latin typeface="Arial" panose="020B0604020202020204" pitchFamily="34" charset="0"/>
+                <a:cs typeface="Arial" panose="020B0604020202020204" pitchFamily="34" charset="0"/>
+              </a:rPr>
+              <a:t> </a:t>
+            </a:r>
+            <a:r>
+              <a:rPr lang="en-US" sz="2400" b="1" dirty="0" err="1">
+                <a:solidFill>
+                  <a:srgbClr val="FF0000"/>
+                </a:solidFill>
+                <a:latin typeface="Arial" panose="020B0604020202020204" pitchFamily="34" charset="0"/>
+                <a:cs typeface="Arial" panose="020B0604020202020204" pitchFamily="34" charset="0"/>
+              </a:rPr>
+              <a:t>dùng</a:t>
+            </a:r>
+            <a:r>
+              <a:rPr lang="en-US" sz="2400" b="1" dirty="0">
+                <a:solidFill>
+                  <a:srgbClr val="FF0000"/>
+                </a:solidFill>
+                <a:latin typeface="Arial" panose="020B0604020202020204" pitchFamily="34" charset="0"/>
+                <a:cs typeface="Arial" panose="020B0604020202020204" pitchFamily="34" charset="0"/>
+              </a:rPr>
+              <a:t> </a:t>
+            </a:r>
+            <a:r>
+              <a:rPr lang="en-US" sz="2400" b="1" dirty="0" err="1">
+                <a:solidFill>
+                  <a:srgbClr val="FF0000"/>
+                </a:solidFill>
+                <a:latin typeface="Arial" panose="020B0604020202020204" pitchFamily="34" charset="0"/>
+                <a:cs typeface="Arial" panose="020B0604020202020204" pitchFamily="34" charset="0"/>
+              </a:rPr>
+              <a:t>xem</a:t>
+            </a:r>
+            <a:r>
+              <a:rPr lang="en-US" sz="2400" b="1" dirty="0">
+                <a:solidFill>
+                  <a:srgbClr val="FF0000"/>
+                </a:solidFill>
+                <a:latin typeface="Arial" panose="020B0604020202020204" pitchFamily="34" charset="0"/>
+                <a:cs typeface="Arial" panose="020B0604020202020204" pitchFamily="34" charset="0"/>
+              </a:rPr>
+              <a:t> </a:t>
+            </a:r>
+            <a:r>
+              <a:rPr lang="en-US" sz="2400" b="1" dirty="0" err="1">
+                <a:solidFill>
+                  <a:srgbClr val="FF0000"/>
+                </a:solidFill>
+                <a:latin typeface="Arial" panose="020B0604020202020204" pitchFamily="34" charset="0"/>
+                <a:cs typeface="Arial" panose="020B0604020202020204" pitchFamily="34" charset="0"/>
+              </a:rPr>
+              <a:t>thông</a:t>
+            </a:r>
+            <a:r>
+              <a:rPr lang="en-US" sz="2400" b="1" dirty="0">
+                <a:solidFill>
+                  <a:srgbClr val="FF0000"/>
+                </a:solidFill>
+                <a:latin typeface="Arial" panose="020B0604020202020204" pitchFamily="34" charset="0"/>
+                <a:cs typeface="Arial" panose="020B0604020202020204" pitchFamily="34" charset="0"/>
+              </a:rPr>
+              <a:t> tin </a:t>
+            </a:r>
+            <a:r>
+              <a:rPr lang="en-US" sz="2400" b="1" dirty="0" err="1">
+                <a:solidFill>
+                  <a:srgbClr val="FF0000"/>
+                </a:solidFill>
+                <a:latin typeface="Arial" panose="020B0604020202020204" pitchFamily="34" charset="0"/>
+                <a:cs typeface="Arial" panose="020B0604020202020204" pitchFamily="34" charset="0"/>
+              </a:rPr>
+              <a:t>của</a:t>
+            </a:r>
+            <a:r>
+              <a:rPr lang="en-US" sz="2400" b="1" dirty="0">
+                <a:solidFill>
+                  <a:srgbClr val="FF0000"/>
+                </a:solidFill>
+                <a:latin typeface="Arial" panose="020B0604020202020204" pitchFamily="34" charset="0"/>
+                <a:cs typeface="Arial" panose="020B0604020202020204" pitchFamily="34" charset="0"/>
+              </a:rPr>
+              <a:t> </a:t>
+            </a:r>
+            <a:r>
+              <a:rPr lang="en-US" sz="2400" b="1" dirty="0" err="1">
+                <a:solidFill>
+                  <a:srgbClr val="FF0000"/>
+                </a:solidFill>
+                <a:latin typeface="Arial" panose="020B0604020202020204" pitchFamily="34" charset="0"/>
+                <a:cs typeface="Arial" panose="020B0604020202020204" pitchFamily="34" charset="0"/>
+              </a:rPr>
+              <a:t>sản</a:t>
+            </a:r>
+            <a:r>
+              <a:rPr lang="en-US" sz="2400" b="1" dirty="0">
+                <a:solidFill>
+                  <a:srgbClr val="FF0000"/>
+                </a:solidFill>
+                <a:latin typeface="Arial" panose="020B0604020202020204" pitchFamily="34" charset="0"/>
+                <a:cs typeface="Arial" panose="020B0604020202020204" pitchFamily="34" charset="0"/>
+              </a:rPr>
+              <a:t> </a:t>
+            </a:r>
+            <a:r>
+              <a:rPr lang="en-US" sz="2400" b="1" dirty="0" err="1">
+                <a:solidFill>
+                  <a:srgbClr val="FF0000"/>
+                </a:solidFill>
+                <a:latin typeface="Arial" panose="020B0604020202020204" pitchFamily="34" charset="0"/>
+                <a:cs typeface="Arial" panose="020B0604020202020204" pitchFamily="34" charset="0"/>
+              </a:rPr>
+              <a:t>phẩm</a:t>
+            </a:r>
+            <a:r>
+              <a:rPr lang="en-US" sz="2400" b="1" dirty="0">
+                <a:solidFill>
+                  <a:srgbClr val="FF0000"/>
+                </a:solidFill>
+                <a:latin typeface="Arial" panose="020B0604020202020204" pitchFamily="34" charset="0"/>
+                <a:cs typeface="Arial" panose="020B0604020202020204" pitchFamily="34" charset="0"/>
+              </a:rPr>
+              <a:t> </a:t>
+            </a:r>
+            <a:r>
+              <a:rPr lang="en-US" sz="2400" b="1" dirty="0" err="1">
+                <a:solidFill>
+                  <a:srgbClr val="FF0000"/>
+                </a:solidFill>
+                <a:latin typeface="Arial" panose="020B0604020202020204" pitchFamily="34" charset="0"/>
+                <a:cs typeface="Arial" panose="020B0604020202020204" pitchFamily="34" charset="0"/>
+              </a:rPr>
+              <a:t>từ</a:t>
+            </a:r>
+            <a:r>
+              <a:rPr lang="en-US" sz="2400" b="1" dirty="0">
+                <a:solidFill>
+                  <a:srgbClr val="FF0000"/>
+                </a:solidFill>
+                <a:latin typeface="Arial" panose="020B0604020202020204" pitchFamily="34" charset="0"/>
+                <a:cs typeface="Arial" panose="020B0604020202020204" pitchFamily="34" charset="0"/>
+              </a:rPr>
+              <a:t> </a:t>
+            </a:r>
+            <a:r>
+              <a:rPr lang="en-US" sz="2400" b="1" dirty="0" err="1">
+                <a:solidFill>
+                  <a:srgbClr val="FF0000"/>
+                </a:solidFill>
+                <a:latin typeface="Arial" panose="020B0604020202020204" pitchFamily="34" charset="0"/>
+                <a:cs typeface="Arial" panose="020B0604020202020204" pitchFamily="34" charset="0"/>
+              </a:rPr>
+              <a:t>một</a:t>
+            </a:r>
+            <a:r>
+              <a:rPr lang="en-US" sz="2400" b="1" dirty="0">
+                <a:solidFill>
+                  <a:srgbClr val="FF0000"/>
+                </a:solidFill>
+                <a:latin typeface="Arial" panose="020B0604020202020204" pitchFamily="34" charset="0"/>
+                <a:cs typeface="Arial" panose="020B0604020202020204" pitchFamily="34" charset="0"/>
+              </a:rPr>
+              <a:t> </a:t>
+            </a:r>
+            <a:r>
+              <a:rPr lang="en-US" sz="2400" b="1" dirty="0" err="1">
+                <a:solidFill>
+                  <a:srgbClr val="FF0000"/>
+                </a:solidFill>
+                <a:latin typeface="Arial" panose="020B0604020202020204" pitchFamily="34" charset="0"/>
+                <a:cs typeface="Arial" panose="020B0604020202020204" pitchFamily="34" charset="0"/>
+              </a:rPr>
+              <a:t>cửa</a:t>
+            </a:r>
+            <a:r>
+              <a:rPr lang="en-US" sz="2400" b="1" dirty="0">
+                <a:solidFill>
+                  <a:srgbClr val="FF0000"/>
+                </a:solidFill>
+                <a:latin typeface="Arial" panose="020B0604020202020204" pitchFamily="34" charset="0"/>
+                <a:cs typeface="Arial" panose="020B0604020202020204" pitchFamily="34" charset="0"/>
+              </a:rPr>
+              <a:t> </a:t>
+            </a:r>
+            <a:r>
+              <a:rPr lang="en-US" sz="2400" b="1" dirty="0" err="1">
+                <a:solidFill>
+                  <a:srgbClr val="FF0000"/>
+                </a:solidFill>
+                <a:latin typeface="Arial" panose="020B0604020202020204" pitchFamily="34" charset="0"/>
+                <a:cs typeface="Arial" panose="020B0604020202020204" pitchFamily="34" charset="0"/>
+              </a:rPr>
+              <a:t>hàng</a:t>
+            </a:r>
+            <a:r>
+              <a:rPr lang="en-US" sz="2400" b="1" dirty="0">
+                <a:solidFill>
+                  <a:srgbClr val="FF0000"/>
+                </a:solidFill>
+                <a:latin typeface="Arial" panose="020B0604020202020204" pitchFamily="34" charset="0"/>
+                <a:cs typeface="Arial" panose="020B0604020202020204" pitchFamily="34" charset="0"/>
+              </a:rPr>
+              <a:t> </a:t>
+            </a:r>
+            <a:r>
+              <a:rPr lang="en-US" sz="2400" b="1" dirty="0" err="1">
+                <a:solidFill>
+                  <a:srgbClr val="FF0000"/>
+                </a:solidFill>
+                <a:latin typeface="Arial" panose="020B0604020202020204" pitchFamily="34" charset="0"/>
+                <a:cs typeface="Arial" panose="020B0604020202020204" pitchFamily="34" charset="0"/>
+              </a:rPr>
+              <a:t>điện</a:t>
+            </a:r>
+            <a:r>
+              <a:rPr lang="en-US" sz="2400" b="1" dirty="0">
+                <a:solidFill>
+                  <a:srgbClr val="FF0000"/>
+                </a:solidFill>
+                <a:latin typeface="Arial" panose="020B0604020202020204" pitchFamily="34" charset="0"/>
+                <a:cs typeface="Arial" panose="020B0604020202020204" pitchFamily="34" charset="0"/>
+              </a:rPr>
+              <a:t> </a:t>
+            </a:r>
+            <a:r>
+              <a:rPr lang="en-US" sz="2400" b="1" dirty="0" err="1">
+                <a:solidFill>
+                  <a:srgbClr val="FF0000"/>
+                </a:solidFill>
+                <a:latin typeface="Arial" panose="020B0604020202020204" pitchFamily="34" charset="0"/>
+                <a:cs typeface="Arial" panose="020B0604020202020204" pitchFamily="34" charset="0"/>
+              </a:rPr>
+              <a:t>máy</a:t>
+            </a:r>
+            <a:r>
+              <a:rPr lang="en-US" sz="2400" b="1" dirty="0">
+                <a:solidFill>
+                  <a:srgbClr val="FF0000"/>
+                </a:solidFill>
+                <a:latin typeface="Arial" panose="020B0604020202020204" pitchFamily="34" charset="0"/>
+                <a:cs typeface="Arial" panose="020B0604020202020204" pitchFamily="34" charset="0"/>
+              </a:rPr>
+              <a:t>. </a:t>
+            </a:r>
+            <a:r>
+              <a:rPr lang="en-US" sz="2400" b="1" dirty="0" err="1">
+                <a:solidFill>
+                  <a:srgbClr val="FF0000"/>
+                </a:solidFill>
+                <a:latin typeface="Arial" panose="020B0604020202020204" pitchFamily="34" charset="0"/>
+                <a:cs typeface="Arial" panose="020B0604020202020204" pitchFamily="34" charset="0"/>
+              </a:rPr>
+              <a:t>Các</a:t>
+            </a:r>
+            <a:r>
+              <a:rPr lang="en-US" sz="2400" b="1" dirty="0">
+                <a:solidFill>
+                  <a:srgbClr val="FF0000"/>
+                </a:solidFill>
+                <a:latin typeface="Arial" panose="020B0604020202020204" pitchFamily="34" charset="0"/>
+                <a:cs typeface="Arial" panose="020B0604020202020204" pitchFamily="34" charset="0"/>
+              </a:rPr>
+              <a:t> </a:t>
+            </a:r>
+            <a:r>
+              <a:rPr lang="en-US" sz="2400" b="1" dirty="0" err="1">
+                <a:solidFill>
+                  <a:srgbClr val="FF0000"/>
+                </a:solidFill>
+                <a:latin typeface="Arial" panose="020B0604020202020204" pitchFamily="34" charset="0"/>
+                <a:cs typeface="Arial" panose="020B0604020202020204" pitchFamily="34" charset="0"/>
+              </a:rPr>
+              <a:t>cấu</a:t>
+            </a:r>
+            <a:r>
+              <a:rPr lang="en-US" sz="2400" b="1" dirty="0">
+                <a:solidFill>
+                  <a:srgbClr val="FF0000"/>
+                </a:solidFill>
+                <a:latin typeface="Arial" panose="020B0604020202020204" pitchFamily="34" charset="0"/>
+                <a:cs typeface="Arial" panose="020B0604020202020204" pitchFamily="34" charset="0"/>
+              </a:rPr>
+              <a:t> </a:t>
+            </a:r>
+            <a:r>
+              <a:rPr lang="en-US" sz="2400" b="1" dirty="0" err="1">
+                <a:solidFill>
+                  <a:srgbClr val="FF0000"/>
+                </a:solidFill>
+                <a:latin typeface="Arial" panose="020B0604020202020204" pitchFamily="34" charset="0"/>
+                <a:cs typeface="Arial" panose="020B0604020202020204" pitchFamily="34" charset="0"/>
+              </a:rPr>
+              <a:t>hình</a:t>
+            </a:r>
+            <a:r>
+              <a:rPr lang="en-US" sz="2400" b="1" dirty="0">
+                <a:solidFill>
+                  <a:srgbClr val="FF0000"/>
+                </a:solidFill>
+                <a:latin typeface="Arial" panose="020B0604020202020204" pitchFamily="34" charset="0"/>
+                <a:cs typeface="Arial" panose="020B0604020202020204" pitchFamily="34" charset="0"/>
+              </a:rPr>
+              <a:t> </a:t>
+            </a:r>
+            <a:r>
+              <a:rPr lang="en-US" sz="2400" b="1" dirty="0" err="1">
+                <a:solidFill>
+                  <a:srgbClr val="FF0000"/>
+                </a:solidFill>
+                <a:latin typeface="Arial" panose="020B0604020202020204" pitchFamily="34" charset="0"/>
+                <a:cs typeface="Arial" panose="020B0604020202020204" pitchFamily="34" charset="0"/>
+              </a:rPr>
+              <a:t>sản</a:t>
+            </a:r>
+            <a:r>
+              <a:rPr lang="en-US" sz="2400" b="1" dirty="0">
+                <a:solidFill>
+                  <a:srgbClr val="FF0000"/>
+                </a:solidFill>
+                <a:latin typeface="Arial" panose="020B0604020202020204" pitchFamily="34" charset="0"/>
+                <a:cs typeface="Arial" panose="020B0604020202020204" pitchFamily="34" charset="0"/>
+              </a:rPr>
+              <a:t> </a:t>
+            </a:r>
+            <a:r>
+              <a:rPr lang="en-US" sz="2400" b="1" dirty="0" err="1">
+                <a:solidFill>
+                  <a:srgbClr val="FF0000"/>
+                </a:solidFill>
+                <a:latin typeface="Arial" panose="020B0604020202020204" pitchFamily="34" charset="0"/>
+                <a:cs typeface="Arial" panose="020B0604020202020204" pitchFamily="34" charset="0"/>
+              </a:rPr>
+              <a:t>phẩm</a:t>
+            </a:r>
+            <a:r>
+              <a:rPr lang="en-US" sz="2400" b="1" dirty="0">
+                <a:solidFill>
+                  <a:srgbClr val="FF0000"/>
+                </a:solidFill>
+                <a:latin typeface="Arial" panose="020B0604020202020204" pitchFamily="34" charset="0"/>
+                <a:cs typeface="Arial" panose="020B0604020202020204" pitchFamily="34" charset="0"/>
+              </a:rPr>
+              <a:t> </a:t>
+            </a:r>
+            <a:r>
+              <a:rPr lang="en-US" sz="2400" b="1" dirty="0" err="1">
+                <a:solidFill>
+                  <a:srgbClr val="FF0000"/>
+                </a:solidFill>
+                <a:latin typeface="Arial" panose="020B0604020202020204" pitchFamily="34" charset="0"/>
+                <a:cs typeface="Arial" panose="020B0604020202020204" pitchFamily="34" charset="0"/>
+              </a:rPr>
+              <a:t>bao</a:t>
+            </a:r>
+            <a:r>
+              <a:rPr lang="en-US" sz="2400" b="1" dirty="0">
+                <a:solidFill>
+                  <a:srgbClr val="FF0000"/>
+                </a:solidFill>
+                <a:latin typeface="Arial" panose="020B0604020202020204" pitchFamily="34" charset="0"/>
+                <a:cs typeface="Arial" panose="020B0604020202020204" pitchFamily="34" charset="0"/>
+              </a:rPr>
+              <a:t> </a:t>
+            </a:r>
+            <a:r>
+              <a:rPr lang="en-US" sz="2400" b="1" dirty="0" err="1">
+                <a:solidFill>
+                  <a:srgbClr val="FF0000"/>
+                </a:solidFill>
+                <a:latin typeface="Arial" panose="020B0604020202020204" pitchFamily="34" charset="0"/>
+                <a:cs typeface="Arial" panose="020B0604020202020204" pitchFamily="34" charset="0"/>
+              </a:rPr>
+              <a:t>gồm</a:t>
+            </a:r>
+            <a:r>
+              <a:rPr lang="en-US" sz="2400" b="1" dirty="0">
+                <a:solidFill>
+                  <a:srgbClr val="FF0000"/>
+                </a:solidFill>
+                <a:latin typeface="Arial" panose="020B0604020202020204" pitchFamily="34" charset="0"/>
+                <a:cs typeface="Arial" panose="020B0604020202020204" pitchFamily="34" charset="0"/>
+              </a:rPr>
+              <a:t>:</a:t>
+            </a:r>
+          </a:p>
+          <a:p>
+            <a:pPr lvl="1"/>
+            <a:endParaRPr lang="en-US" sz="2000" dirty="0" smtClean="0">
+              <a:latin typeface="Arial" panose="020B0604020202020204" pitchFamily="34" charset="0"/>
+              <a:cs typeface="Arial" panose="020B0604020202020204" pitchFamily="34" charset="0"/>
+            </a:endParaRPr>
+          </a:p>
+          <a:p>
+            <a:pPr marL="800100" lvl="1" indent="-342900">
+              <a:buFontTx/>
+              <a:buChar char="-"/>
+            </a:pPr>
+            <a:r>
+              <a:rPr lang="en-US" sz="2000" dirty="0" err="1" smtClean="0">
+                <a:latin typeface="Arial" panose="020B0604020202020204" pitchFamily="34" charset="0"/>
+                <a:cs typeface="Arial" panose="020B0604020202020204" pitchFamily="34" charset="0"/>
+              </a:rPr>
+              <a:t>Khi</a:t>
+            </a:r>
+            <a:r>
+              <a:rPr lang="en-US" sz="2000" dirty="0" smtClean="0">
+                <a:latin typeface="Arial" panose="020B0604020202020204" pitchFamily="34" charset="0"/>
+                <a:cs typeface="Arial" panose="020B0604020202020204" pitchFamily="34" charset="0"/>
+              </a:rPr>
+              <a:t> </a:t>
+            </a:r>
+            <a:r>
+              <a:rPr lang="en-US" sz="2000" dirty="0" err="1" smtClean="0">
+                <a:latin typeface="Arial" panose="020B0604020202020204" pitchFamily="34" charset="0"/>
+                <a:cs typeface="Arial" panose="020B0604020202020204" pitchFamily="34" charset="0"/>
+              </a:rPr>
+              <a:t>chay</a:t>
+            </a:r>
+            <a:r>
+              <a:rPr lang="en-US" sz="2000" dirty="0" smtClean="0">
+                <a:latin typeface="Arial" panose="020B0604020202020204" pitchFamily="34" charset="0"/>
+                <a:cs typeface="Arial" panose="020B0604020202020204" pitchFamily="34" charset="0"/>
+              </a:rPr>
+              <a:t> </a:t>
+            </a:r>
+            <a:r>
+              <a:rPr lang="en-US" sz="2000" dirty="0" err="1" smtClean="0">
+                <a:latin typeface="Arial" panose="020B0604020202020204" pitchFamily="34" charset="0"/>
+                <a:cs typeface="Arial" panose="020B0604020202020204" pitchFamily="34" charset="0"/>
+              </a:rPr>
+              <a:t>len</a:t>
+            </a:r>
+            <a:r>
+              <a:rPr lang="en-US" sz="2000" dirty="0" smtClean="0">
+                <a:latin typeface="Arial" panose="020B0604020202020204" pitchFamily="34" charset="0"/>
+                <a:cs typeface="Arial" panose="020B0604020202020204" pitchFamily="34" charset="0"/>
+              </a:rPr>
+              <a:t> se </a:t>
+            </a:r>
+            <a:r>
+              <a:rPr lang="en-US" sz="2000" dirty="0" err="1" smtClean="0">
+                <a:latin typeface="Arial" panose="020B0604020202020204" pitchFamily="34" charset="0"/>
+                <a:cs typeface="Arial" panose="020B0604020202020204" pitchFamily="34" charset="0"/>
+              </a:rPr>
+              <a:t>hien</a:t>
+            </a:r>
+            <a:r>
+              <a:rPr lang="en-US" sz="2000" dirty="0" smtClean="0">
+                <a:latin typeface="Arial" panose="020B0604020202020204" pitchFamily="34" charset="0"/>
+                <a:cs typeface="Arial" panose="020B0604020202020204" pitchFamily="34" charset="0"/>
+              </a:rPr>
+              <a:t> menu: </a:t>
+            </a:r>
+          </a:p>
+          <a:p>
+            <a:pPr marL="1257300" lvl="2" indent="-342900">
+              <a:buFont typeface="Arial" panose="020B0604020202020204" pitchFamily="34" charset="0"/>
+              <a:buChar char="•"/>
+            </a:pPr>
+            <a:r>
+              <a:rPr lang="en-US" sz="2000" dirty="0" smtClean="0">
+                <a:latin typeface="Arial" panose="020B0604020202020204" pitchFamily="34" charset="0"/>
+                <a:cs typeface="Arial" panose="020B0604020202020204" pitchFamily="34" charset="0"/>
+              </a:rPr>
+              <a:t>1. </a:t>
+            </a:r>
+            <a:r>
+              <a:rPr lang="en-US" sz="2000" dirty="0" err="1" smtClean="0">
+                <a:latin typeface="Arial" panose="020B0604020202020204" pitchFamily="34" charset="0"/>
+                <a:cs typeface="Arial" panose="020B0604020202020204" pitchFamily="34" charset="0"/>
+              </a:rPr>
+              <a:t>Sanh</a:t>
+            </a:r>
+            <a:r>
+              <a:rPr lang="en-US" sz="2000" dirty="0" smtClean="0">
+                <a:latin typeface="Arial" panose="020B0604020202020204" pitchFamily="34" charset="0"/>
+                <a:cs typeface="Arial" panose="020B0604020202020204" pitchFamily="34" charset="0"/>
+              </a:rPr>
+              <a:t> </a:t>
+            </a:r>
+            <a:r>
+              <a:rPr lang="en-US" sz="2000" dirty="0" err="1" smtClean="0">
+                <a:latin typeface="Arial" panose="020B0604020202020204" pitchFamily="34" charset="0"/>
+                <a:cs typeface="Arial" panose="020B0604020202020204" pitchFamily="34" charset="0"/>
+              </a:rPr>
+              <a:t>sach</a:t>
+            </a:r>
+            <a:r>
+              <a:rPr lang="en-US" sz="2000" dirty="0" smtClean="0">
+                <a:latin typeface="Arial" panose="020B0604020202020204" pitchFamily="34" charset="0"/>
+                <a:cs typeface="Arial" panose="020B0604020202020204" pitchFamily="34" charset="0"/>
+              </a:rPr>
+              <a:t> </a:t>
+            </a:r>
+            <a:r>
+              <a:rPr lang="en-US" sz="2000" dirty="0" err="1" smtClean="0">
+                <a:latin typeface="Arial" panose="020B0604020202020204" pitchFamily="34" charset="0"/>
+                <a:cs typeface="Arial" panose="020B0604020202020204" pitchFamily="34" charset="0"/>
+              </a:rPr>
+              <a:t>dien</a:t>
+            </a:r>
+            <a:r>
+              <a:rPr lang="en-US" sz="2000" dirty="0" smtClean="0">
+                <a:latin typeface="Arial" panose="020B0604020202020204" pitchFamily="34" charset="0"/>
+                <a:cs typeface="Arial" panose="020B0604020202020204" pitchFamily="34" charset="0"/>
+              </a:rPr>
+              <a:t> </a:t>
+            </a:r>
+            <a:r>
+              <a:rPr lang="en-US" sz="2000" dirty="0" err="1" smtClean="0">
+                <a:latin typeface="Arial" panose="020B0604020202020204" pitchFamily="34" charset="0"/>
+                <a:cs typeface="Arial" panose="020B0604020202020204" pitchFamily="34" charset="0"/>
+              </a:rPr>
+              <a:t>thoai</a:t>
+            </a:r>
+            <a:r>
+              <a:rPr lang="en-US" sz="2000" dirty="0" smtClean="0">
+                <a:latin typeface="Arial" panose="020B0604020202020204" pitchFamily="34" charset="0"/>
+                <a:cs typeface="Arial" panose="020B0604020202020204" pitchFamily="34" charset="0"/>
+              </a:rPr>
+              <a:t>. </a:t>
+            </a:r>
+          </a:p>
+          <a:p>
+            <a:pPr marL="1257300" lvl="2" indent="-342900">
+              <a:buFont typeface="Arial" panose="020B0604020202020204" pitchFamily="34" charset="0"/>
+              <a:buChar char="•"/>
+            </a:pPr>
+            <a:r>
+              <a:rPr lang="en-US" sz="2000" dirty="0" smtClean="0">
+                <a:latin typeface="Arial" panose="020B0604020202020204" pitchFamily="34" charset="0"/>
+                <a:cs typeface="Arial" panose="020B0604020202020204" pitchFamily="34" charset="0"/>
+              </a:rPr>
+              <a:t>2. </a:t>
+            </a:r>
+            <a:r>
+              <a:rPr lang="en-US" sz="2000" dirty="0" err="1" smtClean="0">
+                <a:latin typeface="Arial" panose="020B0604020202020204" pitchFamily="34" charset="0"/>
+                <a:cs typeface="Arial" panose="020B0604020202020204" pitchFamily="34" charset="0"/>
+              </a:rPr>
+              <a:t>Danh</a:t>
+            </a:r>
+            <a:r>
+              <a:rPr lang="en-US" sz="2000" dirty="0" smtClean="0">
+                <a:latin typeface="Arial" panose="020B0604020202020204" pitchFamily="34" charset="0"/>
+                <a:cs typeface="Arial" panose="020B0604020202020204" pitchFamily="34" charset="0"/>
+              </a:rPr>
+              <a:t> </a:t>
+            </a:r>
+            <a:r>
+              <a:rPr lang="en-US" sz="2000" dirty="0" err="1" smtClean="0">
+                <a:latin typeface="Arial" panose="020B0604020202020204" pitchFamily="34" charset="0"/>
+                <a:cs typeface="Arial" panose="020B0604020202020204" pitchFamily="34" charset="0"/>
+              </a:rPr>
+              <a:t>sach</a:t>
+            </a:r>
+            <a:r>
+              <a:rPr lang="en-US" sz="2000" dirty="0" smtClean="0">
+                <a:latin typeface="Arial" panose="020B0604020202020204" pitchFamily="34" charset="0"/>
+                <a:cs typeface="Arial" panose="020B0604020202020204" pitchFamily="34" charset="0"/>
+              </a:rPr>
+              <a:t> laptop. </a:t>
+            </a:r>
+          </a:p>
+          <a:p>
+            <a:pPr marL="1257300" lvl="2" indent="-342900">
+              <a:buFont typeface="Arial" panose="020B0604020202020204" pitchFamily="34" charset="0"/>
+              <a:buChar char="•"/>
+            </a:pPr>
+            <a:r>
+              <a:rPr lang="en-US" sz="2000" dirty="0" smtClean="0">
+                <a:latin typeface="Arial" panose="020B0604020202020204" pitchFamily="34" charset="0"/>
+                <a:cs typeface="Arial" panose="020B0604020202020204" pitchFamily="34" charset="0"/>
+              </a:rPr>
+              <a:t>0. </a:t>
+            </a:r>
+            <a:r>
+              <a:rPr lang="en-US" sz="2000" dirty="0" err="1" smtClean="0">
+                <a:latin typeface="Arial" panose="020B0604020202020204" pitchFamily="34" charset="0"/>
+                <a:cs typeface="Arial" panose="020B0604020202020204" pitchFamily="34" charset="0"/>
+              </a:rPr>
+              <a:t>Thoai</a:t>
+            </a:r>
+            <a:endParaRPr lang="en-US" sz="2000" dirty="0" smtClean="0">
+              <a:latin typeface="Arial" panose="020B0604020202020204" pitchFamily="34" charset="0"/>
+              <a:cs typeface="Arial" panose="020B0604020202020204" pitchFamily="34" charset="0"/>
+            </a:endParaRPr>
+          </a:p>
+          <a:p>
+            <a:pPr marL="800100" lvl="1" indent="-342900">
+              <a:buFontTx/>
+              <a:buChar char="-"/>
+            </a:pPr>
+            <a:r>
+              <a:rPr lang="en-US" sz="2000" dirty="0" err="1" smtClean="0">
+                <a:latin typeface="Arial" panose="020B0604020202020204" pitchFamily="34" charset="0"/>
+                <a:cs typeface="Arial" panose="020B0604020202020204" pitchFamily="34" charset="0"/>
+              </a:rPr>
+              <a:t>Nhap</a:t>
+            </a:r>
+            <a:r>
+              <a:rPr lang="en-US" sz="2000" dirty="0" smtClean="0">
+                <a:latin typeface="Arial" panose="020B0604020202020204" pitchFamily="34" charset="0"/>
+                <a:cs typeface="Arial" panose="020B0604020202020204" pitchFamily="34" charset="0"/>
+              </a:rPr>
+              <a:t> so 1: In </a:t>
+            </a:r>
+            <a:r>
+              <a:rPr lang="en-US" sz="2000" dirty="0" err="1" smtClean="0">
+                <a:latin typeface="Arial" panose="020B0604020202020204" pitchFamily="34" charset="0"/>
+                <a:cs typeface="Arial" panose="020B0604020202020204" pitchFamily="34" charset="0"/>
+              </a:rPr>
+              <a:t>ra</a:t>
+            </a:r>
+            <a:r>
+              <a:rPr lang="en-US" sz="2000" dirty="0" smtClean="0">
+                <a:latin typeface="Arial" panose="020B0604020202020204" pitchFamily="34" charset="0"/>
+                <a:cs typeface="Arial" panose="020B0604020202020204" pitchFamily="34" charset="0"/>
+              </a:rPr>
+              <a:t> </a:t>
+            </a:r>
+            <a:r>
+              <a:rPr lang="en-US" sz="2000" dirty="0" err="1" smtClean="0">
+                <a:latin typeface="Arial" panose="020B0604020202020204" pitchFamily="34" charset="0"/>
+                <a:cs typeface="Arial" panose="020B0604020202020204" pitchFamily="34" charset="0"/>
+              </a:rPr>
+              <a:t>danh</a:t>
+            </a:r>
+            <a:r>
+              <a:rPr lang="en-US" sz="2000" dirty="0" smtClean="0">
+                <a:latin typeface="Arial" panose="020B0604020202020204" pitchFamily="34" charset="0"/>
+                <a:cs typeface="Arial" panose="020B0604020202020204" pitchFamily="34" charset="0"/>
+              </a:rPr>
+              <a:t> </a:t>
+            </a:r>
+            <a:r>
+              <a:rPr lang="en-US" sz="2000" dirty="0" err="1" smtClean="0">
+                <a:latin typeface="Arial" panose="020B0604020202020204" pitchFamily="34" charset="0"/>
+                <a:cs typeface="Arial" panose="020B0604020202020204" pitchFamily="34" charset="0"/>
+              </a:rPr>
+              <a:t>sach</a:t>
+            </a:r>
+            <a:r>
+              <a:rPr lang="en-US" sz="2000" dirty="0" smtClean="0">
+                <a:latin typeface="Arial" panose="020B0604020202020204" pitchFamily="34" charset="0"/>
+                <a:cs typeface="Arial" panose="020B0604020202020204" pitchFamily="34" charset="0"/>
+              </a:rPr>
+              <a:t> </a:t>
+            </a:r>
+            <a:r>
+              <a:rPr lang="en-US" sz="2000" dirty="0" err="1" smtClean="0">
+                <a:latin typeface="Arial" panose="020B0604020202020204" pitchFamily="34" charset="0"/>
+                <a:cs typeface="Arial" panose="020B0604020202020204" pitchFamily="34" charset="0"/>
+              </a:rPr>
+              <a:t>dien</a:t>
+            </a:r>
+            <a:r>
+              <a:rPr lang="en-US" sz="2000" dirty="0" smtClean="0">
+                <a:latin typeface="Arial" panose="020B0604020202020204" pitchFamily="34" charset="0"/>
+                <a:cs typeface="Arial" panose="020B0604020202020204" pitchFamily="34" charset="0"/>
+              </a:rPr>
+              <a:t> </a:t>
+            </a:r>
+            <a:r>
+              <a:rPr lang="en-US" sz="2000" dirty="0" err="1" smtClean="0">
+                <a:latin typeface="Arial" panose="020B0604020202020204" pitchFamily="34" charset="0"/>
+                <a:cs typeface="Arial" panose="020B0604020202020204" pitchFamily="34" charset="0"/>
+              </a:rPr>
+              <a:t>thoai</a:t>
+            </a:r>
+            <a:r>
+              <a:rPr lang="en-US" sz="2000" dirty="0" smtClean="0">
+                <a:latin typeface="Arial" panose="020B0604020202020204" pitchFamily="34" charset="0"/>
+                <a:cs typeface="Arial" panose="020B0604020202020204" pitchFamily="34" charset="0"/>
+              </a:rPr>
+              <a:t> thong minh</a:t>
+            </a:r>
+          </a:p>
+          <a:p>
+            <a:pPr marL="800100" lvl="1" indent="-342900">
+              <a:buFontTx/>
+              <a:buChar char="-"/>
+            </a:pPr>
+            <a:r>
+              <a:rPr lang="en-US" sz="2000" dirty="0" err="1" smtClean="0">
+                <a:latin typeface="Arial" panose="020B0604020202020204" pitchFamily="34" charset="0"/>
+                <a:cs typeface="Arial" panose="020B0604020202020204" pitchFamily="34" charset="0"/>
+              </a:rPr>
+              <a:t>Nhap</a:t>
+            </a:r>
+            <a:r>
+              <a:rPr lang="en-US" sz="2000" dirty="0" smtClean="0">
+                <a:latin typeface="Arial" panose="020B0604020202020204" pitchFamily="34" charset="0"/>
+                <a:cs typeface="Arial" panose="020B0604020202020204" pitchFamily="34" charset="0"/>
+              </a:rPr>
+              <a:t> so 2: In </a:t>
+            </a:r>
+            <a:r>
+              <a:rPr lang="en-US" sz="2000" dirty="0" err="1" smtClean="0">
+                <a:latin typeface="Arial" panose="020B0604020202020204" pitchFamily="34" charset="0"/>
+                <a:cs typeface="Arial" panose="020B0604020202020204" pitchFamily="34" charset="0"/>
+              </a:rPr>
+              <a:t>ra</a:t>
+            </a:r>
+            <a:r>
+              <a:rPr lang="en-US" sz="2000" dirty="0" smtClean="0">
+                <a:latin typeface="Arial" panose="020B0604020202020204" pitchFamily="34" charset="0"/>
+                <a:cs typeface="Arial" panose="020B0604020202020204" pitchFamily="34" charset="0"/>
+              </a:rPr>
+              <a:t> </a:t>
+            </a:r>
+            <a:r>
+              <a:rPr lang="en-US" sz="2000" dirty="0" err="1" smtClean="0">
+                <a:latin typeface="Arial" panose="020B0604020202020204" pitchFamily="34" charset="0"/>
+                <a:cs typeface="Arial" panose="020B0604020202020204" pitchFamily="34" charset="0"/>
+              </a:rPr>
+              <a:t>danh</a:t>
+            </a:r>
+            <a:r>
+              <a:rPr lang="en-US" sz="2000" dirty="0" smtClean="0">
+                <a:latin typeface="Arial" panose="020B0604020202020204" pitchFamily="34" charset="0"/>
+                <a:cs typeface="Arial" panose="020B0604020202020204" pitchFamily="34" charset="0"/>
+              </a:rPr>
+              <a:t> </a:t>
+            </a:r>
+            <a:r>
+              <a:rPr lang="en-US" sz="2000" dirty="0" err="1" smtClean="0">
+                <a:latin typeface="Arial" panose="020B0604020202020204" pitchFamily="34" charset="0"/>
+                <a:cs typeface="Arial" panose="020B0604020202020204" pitchFamily="34" charset="0"/>
+              </a:rPr>
+              <a:t>sach</a:t>
+            </a:r>
+            <a:r>
+              <a:rPr lang="en-US" sz="2000" dirty="0" smtClean="0">
+                <a:latin typeface="Arial" panose="020B0604020202020204" pitchFamily="34" charset="0"/>
+                <a:cs typeface="Arial" panose="020B0604020202020204" pitchFamily="34" charset="0"/>
+              </a:rPr>
+              <a:t> laptop</a:t>
+            </a:r>
+          </a:p>
+          <a:p>
+            <a:pPr marL="800100" lvl="1" indent="-342900">
+              <a:buFontTx/>
+              <a:buChar char="-"/>
+            </a:pPr>
+            <a:r>
+              <a:rPr lang="en-US" sz="2000" dirty="0" smtClean="0">
+                <a:latin typeface="Arial" panose="020B0604020202020204" pitchFamily="34" charset="0"/>
+                <a:cs typeface="Arial" panose="020B0604020202020204" pitchFamily="34" charset="0"/>
+              </a:rPr>
+              <a:t>2 </a:t>
+            </a:r>
+            <a:r>
+              <a:rPr lang="en-US" sz="2000" dirty="0" err="1" smtClean="0">
+                <a:latin typeface="Arial" panose="020B0604020202020204" pitchFamily="34" charset="0"/>
+                <a:cs typeface="Arial" panose="020B0604020202020204" pitchFamily="34" charset="0"/>
+              </a:rPr>
+              <a:t>Danh</a:t>
+            </a:r>
+            <a:r>
+              <a:rPr lang="en-US" sz="2000" dirty="0" smtClean="0">
+                <a:latin typeface="Arial" panose="020B0604020202020204" pitchFamily="34" charset="0"/>
+                <a:cs typeface="Arial" panose="020B0604020202020204" pitchFamily="34" charset="0"/>
+              </a:rPr>
+              <a:t> </a:t>
+            </a:r>
+            <a:r>
+              <a:rPr lang="en-US" sz="2000" dirty="0" err="1" smtClean="0">
+                <a:latin typeface="Arial" panose="020B0604020202020204" pitchFamily="34" charset="0"/>
+                <a:cs typeface="Arial" panose="020B0604020202020204" pitchFamily="34" charset="0"/>
+              </a:rPr>
+              <a:t>sach</a:t>
+            </a:r>
+            <a:r>
+              <a:rPr lang="en-US" sz="2000" dirty="0" smtClean="0">
+                <a:latin typeface="Arial" panose="020B0604020202020204" pitchFamily="34" charset="0"/>
+                <a:cs typeface="Arial" panose="020B0604020202020204" pitchFamily="34" charset="0"/>
+              </a:rPr>
+              <a:t> </a:t>
+            </a:r>
+            <a:r>
+              <a:rPr lang="en-US" sz="2000" dirty="0" err="1" smtClean="0">
+                <a:latin typeface="Arial" panose="020B0604020202020204" pitchFamily="34" charset="0"/>
+                <a:cs typeface="Arial" panose="020B0604020202020204" pitchFamily="34" charset="0"/>
+              </a:rPr>
+              <a:t>tren</a:t>
+            </a:r>
+            <a:r>
+              <a:rPr lang="en-US" sz="2000" dirty="0" smtClean="0">
+                <a:latin typeface="Arial" panose="020B0604020202020204" pitchFamily="34" charset="0"/>
+                <a:cs typeface="Arial" panose="020B0604020202020204" pitchFamily="34" charset="0"/>
+              </a:rPr>
+              <a:t> </a:t>
+            </a:r>
+            <a:r>
+              <a:rPr lang="en-US" sz="2000" dirty="0" err="1" smtClean="0">
+                <a:latin typeface="Arial" panose="020B0604020202020204" pitchFamily="34" charset="0"/>
+                <a:cs typeface="Arial" panose="020B0604020202020204" pitchFamily="34" charset="0"/>
+              </a:rPr>
+              <a:t>duoc</a:t>
+            </a:r>
+            <a:r>
+              <a:rPr lang="en-US" sz="2000" dirty="0" smtClean="0">
+                <a:latin typeface="Arial" panose="020B0604020202020204" pitchFamily="34" charset="0"/>
+                <a:cs typeface="Arial" panose="020B0604020202020204" pitchFamily="34" charset="0"/>
+              </a:rPr>
+              <a:t> sap </a:t>
+            </a:r>
+            <a:r>
+              <a:rPr lang="en-US" sz="2000" dirty="0" err="1" smtClean="0">
+                <a:latin typeface="Arial" panose="020B0604020202020204" pitchFamily="34" charset="0"/>
+                <a:cs typeface="Arial" panose="020B0604020202020204" pitchFamily="34" charset="0"/>
+              </a:rPr>
+              <a:t>sep</a:t>
+            </a:r>
+            <a:r>
+              <a:rPr lang="en-US" sz="2000" dirty="0" smtClean="0">
+                <a:latin typeface="Arial" panose="020B0604020202020204" pitchFamily="34" charset="0"/>
+                <a:cs typeface="Arial" panose="020B0604020202020204" pitchFamily="34" charset="0"/>
+              </a:rPr>
+              <a:t> </a:t>
+            </a:r>
+            <a:r>
+              <a:rPr lang="en-US" sz="2000" dirty="0" err="1" smtClean="0">
+                <a:latin typeface="Arial" panose="020B0604020202020204" pitchFamily="34" charset="0"/>
+                <a:cs typeface="Arial" panose="020B0604020202020204" pitchFamily="34" charset="0"/>
+              </a:rPr>
+              <a:t>tu</a:t>
+            </a:r>
+            <a:r>
+              <a:rPr lang="en-US" sz="2000" dirty="0" smtClean="0">
+                <a:latin typeface="Arial" panose="020B0604020202020204" pitchFamily="34" charset="0"/>
+                <a:cs typeface="Arial" panose="020B0604020202020204" pitchFamily="34" charset="0"/>
+              </a:rPr>
+              <a:t> 1 -&gt; … </a:t>
+            </a:r>
+            <a:r>
+              <a:rPr lang="en-US" sz="2000" dirty="0" err="1" smtClean="0">
+                <a:latin typeface="Arial" panose="020B0604020202020204" pitchFamily="34" charset="0"/>
+                <a:cs typeface="Arial" panose="020B0604020202020204" pitchFamily="34" charset="0"/>
+              </a:rPr>
+              <a:t>Khi</a:t>
+            </a:r>
+            <a:r>
+              <a:rPr lang="en-US" sz="2000" dirty="0" smtClean="0">
+                <a:latin typeface="Arial" panose="020B0604020202020204" pitchFamily="34" charset="0"/>
+                <a:cs typeface="Arial" panose="020B0604020202020204" pitchFamily="34" charset="0"/>
+              </a:rPr>
+              <a:t> </a:t>
+            </a:r>
+            <a:r>
+              <a:rPr lang="en-US" sz="2000" dirty="0" err="1" smtClean="0">
+                <a:latin typeface="Arial" panose="020B0604020202020204" pitchFamily="34" charset="0"/>
+                <a:cs typeface="Arial" panose="020B0604020202020204" pitchFamily="34" charset="0"/>
+              </a:rPr>
+              <a:t>nguoi</a:t>
+            </a:r>
+            <a:r>
+              <a:rPr lang="en-US" sz="2000" dirty="0" smtClean="0">
+                <a:latin typeface="Arial" panose="020B0604020202020204" pitchFamily="34" charset="0"/>
+                <a:cs typeface="Arial" panose="020B0604020202020204" pitchFamily="34" charset="0"/>
+              </a:rPr>
+              <a:t> dung </a:t>
+            </a:r>
+            <a:r>
+              <a:rPr lang="en-US" sz="2000" dirty="0" err="1" smtClean="0">
+                <a:latin typeface="Arial" panose="020B0604020202020204" pitchFamily="34" charset="0"/>
+                <a:cs typeface="Arial" panose="020B0604020202020204" pitchFamily="34" charset="0"/>
+              </a:rPr>
+              <a:t>nhap</a:t>
+            </a:r>
+            <a:r>
+              <a:rPr lang="en-US" sz="2000" dirty="0" smtClean="0">
+                <a:latin typeface="Arial" panose="020B0604020202020204" pitchFamily="34" charset="0"/>
+                <a:cs typeface="Arial" panose="020B0604020202020204" pitchFamily="34" charset="0"/>
+              </a:rPr>
+              <a:t> so </a:t>
+            </a:r>
+            <a:r>
+              <a:rPr lang="en-US" sz="2000" dirty="0" err="1" smtClean="0">
+                <a:latin typeface="Arial" panose="020B0604020202020204" pitchFamily="34" charset="0"/>
+                <a:cs typeface="Arial" panose="020B0604020202020204" pitchFamily="34" charset="0"/>
+              </a:rPr>
+              <a:t>tuong</a:t>
+            </a:r>
+            <a:r>
+              <a:rPr lang="en-US" sz="2000" dirty="0" smtClean="0">
+                <a:latin typeface="Arial" panose="020B0604020202020204" pitchFamily="34" charset="0"/>
+                <a:cs typeface="Arial" panose="020B0604020202020204" pitchFamily="34" charset="0"/>
+              </a:rPr>
+              <a:t> </a:t>
+            </a:r>
+            <a:r>
+              <a:rPr lang="en-US" sz="2000" dirty="0" err="1" smtClean="0">
+                <a:latin typeface="Arial" panose="020B0604020202020204" pitchFamily="34" charset="0"/>
+                <a:cs typeface="Arial" panose="020B0604020202020204" pitchFamily="34" charset="0"/>
+              </a:rPr>
+              <a:t>ung</a:t>
+            </a:r>
+            <a:r>
+              <a:rPr lang="en-US" sz="2000" dirty="0" smtClean="0">
+                <a:latin typeface="Arial" panose="020B0604020202020204" pitchFamily="34" charset="0"/>
+                <a:cs typeface="Arial" panose="020B0604020202020204" pitchFamily="34" charset="0"/>
+              </a:rPr>
+              <a:t>, in </a:t>
+            </a:r>
+            <a:r>
+              <a:rPr lang="en-US" sz="2000" dirty="0" err="1" smtClean="0">
+                <a:latin typeface="Arial" panose="020B0604020202020204" pitchFamily="34" charset="0"/>
+                <a:cs typeface="Arial" panose="020B0604020202020204" pitchFamily="34" charset="0"/>
+              </a:rPr>
+              <a:t>ra</a:t>
+            </a:r>
+            <a:r>
+              <a:rPr lang="en-US" sz="2000" dirty="0" smtClean="0">
+                <a:latin typeface="Arial" panose="020B0604020202020204" pitchFamily="34" charset="0"/>
+                <a:cs typeface="Arial" panose="020B0604020202020204" pitchFamily="34" charset="0"/>
+              </a:rPr>
+              <a:t> man </a:t>
+            </a:r>
+            <a:r>
+              <a:rPr lang="en-US" sz="2000" dirty="0" err="1" smtClean="0">
+                <a:latin typeface="Arial" panose="020B0604020202020204" pitchFamily="34" charset="0"/>
+                <a:cs typeface="Arial" panose="020B0604020202020204" pitchFamily="34" charset="0"/>
+              </a:rPr>
+              <a:t>hinh</a:t>
+            </a:r>
+            <a:r>
+              <a:rPr lang="en-US" sz="2000" dirty="0" smtClean="0">
+                <a:latin typeface="Arial" panose="020B0604020202020204" pitchFamily="34" charset="0"/>
+                <a:cs typeface="Arial" panose="020B0604020202020204" pitchFamily="34" charset="0"/>
+              </a:rPr>
+              <a:t> </a:t>
+            </a:r>
+            <a:r>
+              <a:rPr lang="en-US" sz="2000" dirty="0" err="1" smtClean="0">
+                <a:latin typeface="Arial" panose="020B0604020202020204" pitchFamily="34" charset="0"/>
+                <a:cs typeface="Arial" panose="020B0604020202020204" pitchFamily="34" charset="0"/>
+              </a:rPr>
+              <a:t>toan</a:t>
+            </a:r>
+            <a:r>
+              <a:rPr lang="en-US" sz="2000" dirty="0" smtClean="0">
+                <a:latin typeface="Arial" panose="020B0604020202020204" pitchFamily="34" charset="0"/>
+                <a:cs typeface="Arial" panose="020B0604020202020204" pitchFamily="34" charset="0"/>
+              </a:rPr>
+              <a:t> </a:t>
+            </a:r>
+            <a:r>
+              <a:rPr lang="en-US" sz="2000" dirty="0" err="1" smtClean="0">
+                <a:latin typeface="Arial" panose="020B0604020202020204" pitchFamily="34" charset="0"/>
+                <a:cs typeface="Arial" panose="020B0604020202020204" pitchFamily="34" charset="0"/>
+              </a:rPr>
+              <a:t>bo</a:t>
+            </a:r>
+            <a:r>
+              <a:rPr lang="en-US" sz="2000" dirty="0" smtClean="0">
+                <a:latin typeface="Arial" panose="020B0604020202020204" pitchFamily="34" charset="0"/>
+                <a:cs typeface="Arial" panose="020B0604020202020204" pitchFamily="34" charset="0"/>
+              </a:rPr>
+              <a:t> thong tin </a:t>
+            </a:r>
+            <a:r>
+              <a:rPr lang="en-US" sz="2000" dirty="0" err="1" smtClean="0">
+                <a:latin typeface="Arial" panose="020B0604020202020204" pitchFamily="34" charset="0"/>
+                <a:cs typeface="Arial" panose="020B0604020202020204" pitchFamily="34" charset="0"/>
+              </a:rPr>
+              <a:t>ve</a:t>
+            </a:r>
+            <a:r>
+              <a:rPr lang="en-US" sz="2000" dirty="0" smtClean="0">
+                <a:latin typeface="Arial" panose="020B0604020202020204" pitchFamily="34" charset="0"/>
+                <a:cs typeface="Arial" panose="020B0604020202020204" pitchFamily="34" charset="0"/>
+              </a:rPr>
+              <a:t> san </a:t>
+            </a:r>
+            <a:r>
+              <a:rPr lang="en-US" sz="2000" dirty="0" err="1" smtClean="0">
+                <a:latin typeface="Arial" panose="020B0604020202020204" pitchFamily="34" charset="0"/>
+                <a:cs typeface="Arial" panose="020B0604020202020204" pitchFamily="34" charset="0"/>
+              </a:rPr>
+              <a:t>pham</a:t>
+            </a:r>
+            <a:endParaRPr lang="en-US" sz="2000" dirty="0" smtClean="0">
+              <a:latin typeface="Arial" panose="020B0604020202020204" pitchFamily="34" charset="0"/>
+              <a:cs typeface="Arial" panose="020B0604020202020204" pitchFamily="34" charset="0"/>
+            </a:endParaRPr>
+          </a:p>
+          <a:p>
+            <a:pPr marL="800100" lvl="1" indent="-342900">
+              <a:buFontTx/>
+              <a:buChar char="-"/>
+            </a:pPr>
+            <a:r>
+              <a:rPr lang="en-US" sz="2000" dirty="0" err="1" smtClean="0">
+                <a:latin typeface="Arial" panose="020B0604020202020204" pitchFamily="34" charset="0"/>
+                <a:cs typeface="Arial" panose="020B0604020202020204" pitchFamily="34" charset="0"/>
+              </a:rPr>
+              <a:t>Sau</a:t>
+            </a:r>
+            <a:r>
+              <a:rPr lang="en-US" sz="2000" dirty="0" smtClean="0">
+                <a:latin typeface="Arial" panose="020B0604020202020204" pitchFamily="34" charset="0"/>
+                <a:cs typeface="Arial" panose="020B0604020202020204" pitchFamily="34" charset="0"/>
+              </a:rPr>
+              <a:t> </a:t>
+            </a:r>
+            <a:r>
+              <a:rPr lang="en-US" sz="2000" dirty="0" err="1" smtClean="0">
+                <a:latin typeface="Arial" panose="020B0604020202020204" pitchFamily="34" charset="0"/>
+                <a:cs typeface="Arial" panose="020B0604020202020204" pitchFamily="34" charset="0"/>
+              </a:rPr>
+              <a:t>khi</a:t>
+            </a:r>
+            <a:r>
+              <a:rPr lang="en-US" sz="2000" dirty="0" smtClean="0">
+                <a:latin typeface="Arial" panose="020B0604020202020204" pitchFamily="34" charset="0"/>
+                <a:cs typeface="Arial" panose="020B0604020202020204" pitchFamily="34" charset="0"/>
+              </a:rPr>
+              <a:t> in </a:t>
+            </a:r>
+            <a:r>
+              <a:rPr lang="en-US" sz="2000" dirty="0" err="1" smtClean="0">
+                <a:latin typeface="Arial" panose="020B0604020202020204" pitchFamily="34" charset="0"/>
+                <a:cs typeface="Arial" panose="020B0604020202020204" pitchFamily="34" charset="0"/>
+              </a:rPr>
+              <a:t>ra</a:t>
+            </a:r>
+            <a:r>
+              <a:rPr lang="en-US" sz="2000" dirty="0" smtClean="0">
+                <a:latin typeface="Arial" panose="020B0604020202020204" pitchFamily="34" charset="0"/>
+                <a:cs typeface="Arial" panose="020B0604020202020204" pitchFamily="34" charset="0"/>
+              </a:rPr>
+              <a:t> </a:t>
+            </a:r>
+            <a:r>
+              <a:rPr lang="en-US" sz="2000" dirty="0" err="1" smtClean="0">
+                <a:latin typeface="Arial" panose="020B0604020202020204" pitchFamily="34" charset="0"/>
+                <a:cs typeface="Arial" panose="020B0604020202020204" pitchFamily="34" charset="0"/>
+              </a:rPr>
+              <a:t>toan</a:t>
+            </a:r>
+            <a:r>
+              <a:rPr lang="en-US" sz="2000" dirty="0" smtClean="0">
+                <a:latin typeface="Arial" panose="020B0604020202020204" pitchFamily="34" charset="0"/>
+                <a:cs typeface="Arial" panose="020B0604020202020204" pitchFamily="34" charset="0"/>
+              </a:rPr>
+              <a:t> </a:t>
+            </a:r>
+            <a:r>
+              <a:rPr lang="en-US" sz="2000" dirty="0" err="1" smtClean="0">
+                <a:latin typeface="Arial" panose="020B0604020202020204" pitchFamily="34" charset="0"/>
+                <a:cs typeface="Arial" panose="020B0604020202020204" pitchFamily="34" charset="0"/>
+              </a:rPr>
+              <a:t>bo</a:t>
+            </a:r>
+            <a:r>
+              <a:rPr lang="en-US" sz="2000" dirty="0" smtClean="0">
+                <a:latin typeface="Arial" panose="020B0604020202020204" pitchFamily="34" charset="0"/>
+                <a:cs typeface="Arial" panose="020B0604020202020204" pitchFamily="34" charset="0"/>
+              </a:rPr>
+              <a:t> thong tin </a:t>
+            </a:r>
+            <a:r>
+              <a:rPr lang="en-US" sz="2000" dirty="0" err="1" smtClean="0">
+                <a:latin typeface="Arial" panose="020B0604020202020204" pitchFamily="34" charset="0"/>
+                <a:cs typeface="Arial" panose="020B0604020202020204" pitchFamily="34" charset="0"/>
+              </a:rPr>
+              <a:t>thi</a:t>
+            </a:r>
+            <a:r>
+              <a:rPr lang="en-US" sz="2000" dirty="0" smtClean="0">
+                <a:latin typeface="Arial" panose="020B0604020202020204" pitchFamily="34" charset="0"/>
+                <a:cs typeface="Arial" panose="020B0604020202020204" pitchFamily="34" charset="0"/>
+              </a:rPr>
+              <a:t> </a:t>
+            </a:r>
+            <a:r>
+              <a:rPr lang="en-US" sz="2000" dirty="0" err="1" smtClean="0">
+                <a:latin typeface="Arial" panose="020B0604020202020204" pitchFamily="34" charset="0"/>
+                <a:cs typeface="Arial" panose="020B0604020202020204" pitchFamily="34" charset="0"/>
+              </a:rPr>
+              <a:t>cho</a:t>
+            </a:r>
+            <a:r>
+              <a:rPr lang="en-US" sz="2000" dirty="0" smtClean="0">
+                <a:latin typeface="Arial" panose="020B0604020202020204" pitchFamily="34" charset="0"/>
+                <a:cs typeface="Arial" panose="020B0604020202020204" pitchFamily="34" charset="0"/>
+              </a:rPr>
+              <a:t> </a:t>
+            </a:r>
+            <a:r>
+              <a:rPr lang="en-US" sz="2000" dirty="0" err="1" smtClean="0">
+                <a:latin typeface="Arial" panose="020B0604020202020204" pitchFamily="34" charset="0"/>
+                <a:cs typeface="Arial" panose="020B0604020202020204" pitchFamily="34" charset="0"/>
+              </a:rPr>
+              <a:t>phep</a:t>
+            </a:r>
+            <a:r>
+              <a:rPr lang="en-US" sz="2000" dirty="0" smtClean="0">
+                <a:latin typeface="Arial" panose="020B0604020202020204" pitchFamily="34" charset="0"/>
+                <a:cs typeface="Arial" panose="020B0604020202020204" pitchFamily="34" charset="0"/>
+              </a:rPr>
+              <a:t> chon </a:t>
+            </a:r>
+            <a:r>
+              <a:rPr lang="en-US" sz="2000" dirty="0" err="1" smtClean="0">
+                <a:latin typeface="Arial" panose="020B0604020202020204" pitchFamily="34" charset="0"/>
+                <a:cs typeface="Arial" panose="020B0604020202020204" pitchFamily="34" charset="0"/>
+              </a:rPr>
+              <a:t>lai</a:t>
+            </a:r>
+            <a:r>
+              <a:rPr lang="en-US" sz="2000" dirty="0" smtClean="0">
+                <a:latin typeface="Arial" panose="020B0604020202020204" pitchFamily="34" charset="0"/>
+                <a:cs typeface="Arial" panose="020B0604020202020204" pitchFamily="34" charset="0"/>
+              </a:rPr>
+              <a:t> 1 </a:t>
+            </a:r>
+            <a:r>
+              <a:rPr lang="en-US" sz="2000" dirty="0" err="1" smtClean="0">
+                <a:latin typeface="Arial" panose="020B0604020202020204" pitchFamily="34" charset="0"/>
+                <a:cs typeface="Arial" panose="020B0604020202020204" pitchFamily="34" charset="0"/>
+              </a:rPr>
+              <a:t>hoac</a:t>
+            </a:r>
+            <a:r>
+              <a:rPr lang="en-US" sz="2000" dirty="0" smtClean="0">
+                <a:latin typeface="Arial" panose="020B0604020202020204" pitchFamily="34" charset="0"/>
+                <a:cs typeface="Arial" panose="020B0604020202020204" pitchFamily="34" charset="0"/>
+              </a:rPr>
+              <a:t> 2</a:t>
+            </a:r>
+          </a:p>
+          <a:p>
+            <a:pPr marL="800100" lvl="1" indent="-342900">
+              <a:buFontTx/>
+              <a:buChar char="-"/>
+            </a:pPr>
+            <a:r>
+              <a:rPr lang="en-US" sz="2000" dirty="0" smtClean="0">
+                <a:latin typeface="Arial" panose="020B0604020202020204" pitchFamily="34" charset="0"/>
+                <a:cs typeface="Arial" panose="020B0604020202020204" pitchFamily="34" charset="0"/>
+              </a:rPr>
+              <a:t>Chon 0 de dung </a:t>
+            </a:r>
+            <a:r>
+              <a:rPr lang="en-US" sz="2000" dirty="0" err="1" smtClean="0">
+                <a:latin typeface="Arial" panose="020B0604020202020204" pitchFamily="34" charset="0"/>
+                <a:cs typeface="Arial" panose="020B0604020202020204" pitchFamily="34" charset="0"/>
+              </a:rPr>
+              <a:t>chuong</a:t>
+            </a:r>
+            <a:r>
+              <a:rPr lang="en-US" sz="2000" dirty="0" smtClean="0">
+                <a:latin typeface="Arial" panose="020B0604020202020204" pitchFamily="34" charset="0"/>
+                <a:cs typeface="Arial" panose="020B0604020202020204" pitchFamily="34" charset="0"/>
+              </a:rPr>
+              <a:t> </a:t>
+            </a:r>
+            <a:r>
+              <a:rPr lang="en-US" sz="2000" dirty="0" err="1" smtClean="0">
+                <a:latin typeface="Arial" panose="020B0604020202020204" pitchFamily="34" charset="0"/>
+                <a:cs typeface="Arial" panose="020B0604020202020204" pitchFamily="34" charset="0"/>
+              </a:rPr>
+              <a:t>trinh</a:t>
+            </a:r>
+            <a:endParaRPr lang="en-US" sz="2000" dirty="0">
+              <a:latin typeface="Arial" panose="020B0604020202020204" pitchFamily="34" charset="0"/>
+              <a:cs typeface="Arial" panose="020B0604020202020204" pitchFamily="34" charset="0"/>
+            </a:endParaRPr>
+          </a:p>
+        </p:txBody>
+      </p:sp>
+    </p:spTree>
+    <p:extLst>
+      <p:ext uri="{BB962C8B-B14F-4D97-AF65-F5344CB8AC3E}">
+        <p14:creationId xmlns:p14="http://schemas.microsoft.com/office/powerpoint/2010/main" val="3760266553"/>
+      </p:ext>
+    </p:extLst>
+  </p:cSld>
+  <p:clrMapOvr>
+    <a:masterClrMapping/>
+  </p:clrMapOvr>
+  <p:transition spd="slow">
+    <p:pull dir="r"/>
+  </p:transition>
+</p:sld>
+</file>
+
+<file path=ppt/slides/slide8.xml><?xml version="1.0" encoding="utf-8"?>
+<p:sld xmlns:a="http://schemas.openxmlformats.org/drawingml/2006/main" xmlns:r="http://schemas.openxmlformats.org/officeDocument/2006/relationships" xmlns:p="http://schemas.openxmlformats.org/presentationml/2006/main">
+  <p:cSld>
+    <p:spTree>
+      <p:nvGrpSpPr>
+        <p:cNvPr id="1" name=""/>
+        <p:cNvGrpSpPr/>
+        <p:nvPr/>
+      </p:nvGrpSpPr>
+      <p:grpSpPr>
+        <a:xfrm>
+          <a:off x="0" y="0"/>
+          <a:ext cx="0" cy="0"/>
+          <a:chOff x="0" y="0"/>
+          <a:chExt cx="0" cy="0"/>
+        </a:xfrm>
+      </p:grpSpPr>
+      <p:sp>
+        <p:nvSpPr>
+          <p:cNvPr id="4" name="Title 1"/>
+          <p:cNvSpPr txBox="1">
+            <a:spLocks/>
+          </p:cNvSpPr>
+          <p:nvPr/>
+        </p:nvSpPr>
+        <p:spPr>
+          <a:xfrm>
+            <a:off x="4800600" y="17991"/>
+            <a:ext cx="4267200" cy="762000"/>
+          </a:xfrm>
+          <a:prstGeom prst="rect">
+            <a:avLst/>
+          </a:prstGeom>
+        </p:spPr>
+        <p:txBody>
+          <a:bodyPr vert="horz" lIns="91440" tIns="45720" rIns="91440" bIns="45720" rtlCol="0" anchor="ctr">
+            <a:normAutofit/>
+          </a:bodyPr>
+          <a:lstStyle>
+            <a:lvl1pPr algn="ctr" defTabSz="914400" rtl="0" eaLnBrk="1" latinLnBrk="0" hangingPunct="1">
+              <a:spcBef>
+                <a:spcPct val="0"/>
+              </a:spcBef>
+              <a:buNone/>
+              <a:defRPr sz="4400" kern="1200">
+                <a:solidFill>
+                  <a:schemeClr val="tx1"/>
+                </a:solidFill>
+                <a:latin typeface="+mj-lt"/>
+                <a:ea typeface="+mj-ea"/>
+                <a:cs typeface="+mj-cs"/>
+              </a:defRPr>
+            </a:lvl1pPr>
+          </a:lstStyle>
+          <a:p>
+            <a:r>
+              <a:rPr lang="en-US" sz="2000" b="1" dirty="0">
+                <a:solidFill>
+                  <a:srgbClr val="FF0000"/>
+                </a:solidFill>
+                <a:latin typeface="Arial" panose="020B0604020202020204" pitchFamily="34" charset="0"/>
+                <a:cs typeface="Arial" panose="020B0604020202020204" pitchFamily="34" charset="0"/>
+              </a:rPr>
+              <a:t>KHÓA HỌC JAVA WEB - FE</a:t>
+            </a:r>
+          </a:p>
+          <a:p>
+            <a:r>
+              <a:rPr lang="en-US" sz="1200" b="1" i="1" u="sng" dirty="0" err="1">
+                <a:solidFill>
+                  <a:srgbClr val="FF0000"/>
+                </a:solidFill>
+                <a:latin typeface="Arial" panose="020B0604020202020204" pitchFamily="34" charset="0"/>
+                <a:cs typeface="Arial" panose="020B0604020202020204" pitchFamily="34" charset="0"/>
+              </a:rPr>
+              <a:t>Biên</a:t>
+            </a:r>
+            <a:r>
+              <a:rPr lang="en-US" sz="1200" b="1" i="1" u="sng" dirty="0">
+                <a:solidFill>
+                  <a:srgbClr val="FF0000"/>
+                </a:solidFill>
+                <a:latin typeface="Arial" panose="020B0604020202020204" pitchFamily="34" charset="0"/>
+                <a:cs typeface="Arial" panose="020B0604020202020204" pitchFamily="34" charset="0"/>
+              </a:rPr>
+              <a:t> </a:t>
+            </a:r>
+            <a:r>
+              <a:rPr lang="en-US" sz="1200" b="1" i="1" u="sng" dirty="0" err="1">
+                <a:solidFill>
+                  <a:srgbClr val="FF0000"/>
+                </a:solidFill>
+                <a:latin typeface="Arial" panose="020B0604020202020204" pitchFamily="34" charset="0"/>
+                <a:cs typeface="Arial" panose="020B0604020202020204" pitchFamily="34" charset="0"/>
+              </a:rPr>
+              <a:t>soạn</a:t>
+            </a:r>
+            <a:r>
+              <a:rPr lang="en-US" sz="1200" b="1" i="1" u="sng" dirty="0">
+                <a:solidFill>
+                  <a:srgbClr val="FF0000"/>
+                </a:solidFill>
+                <a:latin typeface="Arial" panose="020B0604020202020204" pitchFamily="34" charset="0"/>
+                <a:cs typeface="Arial" panose="020B0604020202020204" pitchFamily="34" charset="0"/>
+              </a:rPr>
+              <a:t>:</a:t>
+            </a:r>
+            <a:r>
+              <a:rPr lang="en-US" sz="1200" b="1" i="1" dirty="0">
+                <a:solidFill>
+                  <a:srgbClr val="FF0000"/>
+                </a:solidFill>
+                <a:latin typeface="Arial" panose="020B0604020202020204" pitchFamily="34" charset="0"/>
+                <a:cs typeface="Arial" panose="020B0604020202020204" pitchFamily="34" charset="0"/>
+              </a:rPr>
+              <a:t> T3H</a:t>
+            </a:r>
+          </a:p>
+        </p:txBody>
+      </p:sp>
+      <p:pic>
+        <p:nvPicPr>
+          <p:cNvPr id="5" name="Picture 5" descr="C:\Users\Admin\Desktop\tải xuống.png"/>
+          <p:cNvPicPr>
+            <a:picLocks noChangeAspect="1" noChangeArrowheads="1"/>
+          </p:cNvPicPr>
+          <p:nvPr/>
+        </p:nvPicPr>
+        <p:blipFill>
+          <a:blip r:embed="rId2">
+            <a:extLst>
+              <a:ext uri="{28A0092B-C50C-407E-A947-70E740481C1C}">
+                <a14:useLocalDpi xmlns:a14="http://schemas.microsoft.com/office/drawing/2010/main" val="0"/>
+              </a:ext>
+            </a:extLst>
+          </a:blip>
+          <a:srcRect/>
+          <a:stretch>
+            <a:fillRect/>
+          </a:stretch>
+        </p:blipFill>
+        <p:spPr bwMode="auto">
+          <a:xfrm>
+            <a:off x="23734" y="7937"/>
+            <a:ext cx="3883433" cy="772054"/>
+          </a:xfrm>
+          <a:prstGeom prst="rect">
+            <a:avLst/>
+          </a:prstGeom>
+          <a:noFill/>
+          <a:extLst>
+            <a:ext uri="{909E8E84-426E-40DD-AFC4-6F175D3DCCD1}">
+              <a14:hiddenFill xmlns:a14="http://schemas.microsoft.com/office/drawing/2010/main">
+                <a:solidFill>
+                  <a:srgbClr val="FFFFFF"/>
+                </a:solidFill>
+              </a14:hiddenFill>
+            </a:ext>
+          </a:extLst>
+        </p:spPr>
+      </p:pic>
+      <p:cxnSp>
+        <p:nvCxnSpPr>
+          <p:cNvPr id="8" name="Straight Connector 7"/>
+          <p:cNvCxnSpPr/>
+          <p:nvPr/>
+        </p:nvCxnSpPr>
+        <p:spPr>
+          <a:xfrm>
+            <a:off x="0" y="779991"/>
+            <a:ext cx="9144000" cy="0"/>
+          </a:xfrm>
+          <a:prstGeom prst="line">
+            <a:avLst/>
+          </a:prstGeom>
+          <a:ln w="6350">
+            <a:prstDash val="sysDot"/>
+          </a:ln>
+        </p:spPr>
+        <p:style>
+          <a:lnRef idx="1">
+            <a:schemeClr val="accent1"/>
+          </a:lnRef>
+          <a:fillRef idx="0">
+            <a:schemeClr val="accent1"/>
+          </a:fillRef>
+          <a:effectRef idx="0">
+            <a:schemeClr val="accent1"/>
+          </a:effectRef>
+          <a:fontRef idx="minor">
+            <a:schemeClr val="tx1"/>
+          </a:fontRef>
+        </p:style>
+      </p:cxnSp>
+      <p:sp>
+        <p:nvSpPr>
+          <p:cNvPr id="9" name="Rectangle 8"/>
+          <p:cNvSpPr/>
+          <p:nvPr/>
+        </p:nvSpPr>
+        <p:spPr>
+          <a:xfrm>
+            <a:off x="-9334" y="914400"/>
             <a:ext cx="9153334" cy="5632311"/>
           </a:xfrm>
           <a:prstGeom prst="rect">
@@ -9957,7 +11854,7 @@
 </p:sld>
 </file>
 
-<file path=ppt/slides/slide8.xml><?xml version="1.0" encoding="utf-8"?>
+<file path=ppt/slides/slide9.xml><?xml version="1.0" encoding="utf-8"?>
 <p:sld xmlns:a="http://schemas.openxmlformats.org/drawingml/2006/main" xmlns:r="http://schemas.openxmlformats.org/officeDocument/2006/relationships" xmlns:p="http://schemas.openxmlformats.org/presentationml/2006/main">
   <p:cSld>
     <p:spTree>
@@ -10668,305 +12565,6 @@
     <p:extLst>
       <p:ext uri="{BB962C8B-B14F-4D97-AF65-F5344CB8AC3E}">
         <p14:creationId xmlns:p14="http://schemas.microsoft.com/office/powerpoint/2010/main" val="4174715298"/>
-      </p:ext>
-    </p:extLst>
-  </p:cSld>
-  <p:clrMapOvr>
-    <a:masterClrMapping/>
-  </p:clrMapOvr>
-  <p:transition spd="slow">
-    <p:pull dir="r"/>
-  </p:transition>
-</p:sld>
-</file>
-
-<file path=ppt/slides/slide9.xml><?xml version="1.0" encoding="utf-8"?>
-<p:sld xmlns:a="http://schemas.openxmlformats.org/drawingml/2006/main" xmlns:r="http://schemas.openxmlformats.org/officeDocument/2006/relationships" xmlns:p="http://schemas.openxmlformats.org/presentationml/2006/main">
-  <p:cSld>
-    <p:spTree>
-      <p:nvGrpSpPr>
-        <p:cNvPr id="1" name=""/>
-        <p:cNvGrpSpPr/>
-        <p:nvPr/>
-      </p:nvGrpSpPr>
-      <p:grpSpPr>
-        <a:xfrm>
-          <a:off x="0" y="0"/>
-          <a:ext cx="0" cy="0"/>
-          <a:chOff x="0" y="0"/>
-          <a:chExt cx="0" cy="0"/>
-        </a:xfrm>
-      </p:grpSpPr>
-      <p:sp>
-        <p:nvSpPr>
-          <p:cNvPr id="4" name="Title 1"/>
-          <p:cNvSpPr txBox="1">
-            <a:spLocks/>
-          </p:cNvSpPr>
-          <p:nvPr/>
-        </p:nvSpPr>
-        <p:spPr>
-          <a:xfrm>
-            <a:off x="4800600" y="17991"/>
-            <a:ext cx="4267200" cy="762000"/>
-          </a:xfrm>
-          <a:prstGeom prst="rect">
-            <a:avLst/>
-          </a:prstGeom>
-        </p:spPr>
-        <p:txBody>
-          <a:bodyPr vert="horz" lIns="91440" tIns="45720" rIns="91440" bIns="45720" rtlCol="0" anchor="ctr">
-            <a:normAutofit/>
-          </a:bodyPr>
-          <a:lstStyle>
-            <a:lvl1pPr algn="ctr" defTabSz="914400" rtl="0" eaLnBrk="1" latinLnBrk="0" hangingPunct="1">
-              <a:spcBef>
-                <a:spcPct val="0"/>
-              </a:spcBef>
-              <a:buNone/>
-              <a:defRPr sz="4400" kern="1200">
-                <a:solidFill>
-                  <a:schemeClr val="tx1"/>
-                </a:solidFill>
-                <a:latin typeface="+mj-lt"/>
-                <a:ea typeface="+mj-ea"/>
-                <a:cs typeface="+mj-cs"/>
-              </a:defRPr>
-            </a:lvl1pPr>
-          </a:lstStyle>
-          <a:p>
-            <a:r>
-              <a:rPr lang="en-US" sz="2000" b="1" dirty="0">
-                <a:solidFill>
-                  <a:srgbClr val="FF0000"/>
-                </a:solidFill>
-                <a:latin typeface="Arial" panose="020B0604020202020204" pitchFamily="34" charset="0"/>
-                <a:cs typeface="Arial" panose="020B0604020202020204" pitchFamily="34" charset="0"/>
-              </a:rPr>
-              <a:t>KHÓA HỌC JAVA WEB - FE</a:t>
-            </a:r>
-          </a:p>
-          <a:p>
-            <a:r>
-              <a:rPr lang="en-US" sz="1200" b="1" i="1" u="sng" dirty="0" err="1">
-                <a:solidFill>
-                  <a:srgbClr val="FF0000"/>
-                </a:solidFill>
-                <a:latin typeface="Arial" panose="020B0604020202020204" pitchFamily="34" charset="0"/>
-                <a:cs typeface="Arial" panose="020B0604020202020204" pitchFamily="34" charset="0"/>
-              </a:rPr>
-              <a:t>Biên</a:t>
-            </a:r>
-            <a:r>
-              <a:rPr lang="en-US" sz="1200" b="1" i="1" u="sng" dirty="0">
-                <a:solidFill>
-                  <a:srgbClr val="FF0000"/>
-                </a:solidFill>
-                <a:latin typeface="Arial" panose="020B0604020202020204" pitchFamily="34" charset="0"/>
-                <a:cs typeface="Arial" panose="020B0604020202020204" pitchFamily="34" charset="0"/>
-              </a:rPr>
-              <a:t> </a:t>
-            </a:r>
-            <a:r>
-              <a:rPr lang="en-US" sz="1200" b="1" i="1" u="sng" dirty="0" err="1">
-                <a:solidFill>
-                  <a:srgbClr val="FF0000"/>
-                </a:solidFill>
-                <a:latin typeface="Arial" panose="020B0604020202020204" pitchFamily="34" charset="0"/>
-                <a:cs typeface="Arial" panose="020B0604020202020204" pitchFamily="34" charset="0"/>
-              </a:rPr>
-              <a:t>soạn</a:t>
-            </a:r>
-            <a:r>
-              <a:rPr lang="en-US" sz="1200" b="1" i="1" u="sng" dirty="0">
-                <a:solidFill>
-                  <a:srgbClr val="FF0000"/>
-                </a:solidFill>
-                <a:latin typeface="Arial" panose="020B0604020202020204" pitchFamily="34" charset="0"/>
-                <a:cs typeface="Arial" panose="020B0604020202020204" pitchFamily="34" charset="0"/>
-              </a:rPr>
-              <a:t>:</a:t>
-            </a:r>
-            <a:r>
-              <a:rPr lang="en-US" sz="1200" b="1" i="1" dirty="0">
-                <a:solidFill>
-                  <a:srgbClr val="FF0000"/>
-                </a:solidFill>
-                <a:latin typeface="Arial" panose="020B0604020202020204" pitchFamily="34" charset="0"/>
-                <a:cs typeface="Arial" panose="020B0604020202020204" pitchFamily="34" charset="0"/>
-              </a:rPr>
-              <a:t> T3H</a:t>
-            </a:r>
-          </a:p>
-        </p:txBody>
-      </p:sp>
-      <p:pic>
-        <p:nvPicPr>
-          <p:cNvPr id="5" name="Picture 5" descr="C:\Users\Admin\Desktop\tải xuống.png"/>
-          <p:cNvPicPr>
-            <a:picLocks noChangeAspect="1" noChangeArrowheads="1"/>
-          </p:cNvPicPr>
-          <p:nvPr/>
-        </p:nvPicPr>
-        <p:blipFill>
-          <a:blip r:embed="rId2">
-            <a:extLst>
-              <a:ext uri="{28A0092B-C50C-407E-A947-70E740481C1C}">
-                <a14:useLocalDpi xmlns:a14="http://schemas.microsoft.com/office/drawing/2010/main" val="0"/>
-              </a:ext>
-            </a:extLst>
-          </a:blip>
-          <a:srcRect/>
-          <a:stretch>
-            <a:fillRect/>
-          </a:stretch>
-        </p:blipFill>
-        <p:spPr bwMode="auto">
-          <a:xfrm>
-            <a:off x="23734" y="7937"/>
-            <a:ext cx="3883433" cy="772054"/>
-          </a:xfrm>
-          <a:prstGeom prst="rect">
-            <a:avLst/>
-          </a:prstGeom>
-          <a:noFill/>
-          <a:extLst>
-            <a:ext uri="{909E8E84-426E-40DD-AFC4-6F175D3DCCD1}">
-              <a14:hiddenFill xmlns:a14="http://schemas.microsoft.com/office/drawing/2010/main">
-                <a:solidFill>
-                  <a:srgbClr val="FFFFFF"/>
-                </a:solidFill>
-              </a14:hiddenFill>
-            </a:ext>
-          </a:extLst>
-        </p:spPr>
-      </p:pic>
-      <p:cxnSp>
-        <p:nvCxnSpPr>
-          <p:cNvPr id="8" name="Straight Connector 7"/>
-          <p:cNvCxnSpPr/>
-          <p:nvPr/>
-        </p:nvCxnSpPr>
-        <p:spPr>
-          <a:xfrm>
-            <a:off x="0" y="779991"/>
-            <a:ext cx="9144000" cy="0"/>
-          </a:xfrm>
-          <a:prstGeom prst="line">
-            <a:avLst/>
-          </a:prstGeom>
-          <a:ln w="6350">
-            <a:prstDash val="sysDot"/>
-          </a:ln>
-        </p:spPr>
-        <p:style>
-          <a:lnRef idx="1">
-            <a:schemeClr val="accent1"/>
-          </a:lnRef>
-          <a:fillRef idx="0">
-            <a:schemeClr val="accent1"/>
-          </a:fillRef>
-          <a:effectRef idx="0">
-            <a:schemeClr val="accent1"/>
-          </a:effectRef>
-          <a:fontRef idx="minor">
-            <a:schemeClr val="tx1"/>
-          </a:fontRef>
-        </p:style>
-      </p:cxnSp>
-      <p:sp>
-        <p:nvSpPr>
-          <p:cNvPr id="9" name="Rectangle 8"/>
-          <p:cNvSpPr/>
-          <p:nvPr/>
-        </p:nvSpPr>
-        <p:spPr>
-          <a:xfrm>
-            <a:off x="-9334" y="914400"/>
-            <a:ext cx="9153334" cy="1200329"/>
-          </a:xfrm>
-          <a:prstGeom prst="rect">
-            <a:avLst/>
-          </a:prstGeom>
-        </p:spPr>
-        <p:txBody>
-          <a:bodyPr wrap="square">
-            <a:spAutoFit/>
-          </a:bodyPr>
-          <a:lstStyle/>
-          <a:p>
-            <a:r>
-              <a:rPr lang="en-US" sz="2400" b="1" dirty="0">
-                <a:solidFill>
-                  <a:srgbClr val="FF0000"/>
-                </a:solidFill>
-                <a:latin typeface="Arial" panose="020B0604020202020204" pitchFamily="34" charset="0"/>
-                <a:cs typeface="Arial" panose="020B0604020202020204" pitchFamily="34" charset="0"/>
-              </a:rPr>
-              <a:t>IV.   </a:t>
-            </a:r>
-            <a:r>
-              <a:rPr lang="en-US" sz="2400" b="1" dirty="0" err="1">
-                <a:solidFill>
-                  <a:srgbClr val="FF0000"/>
-                </a:solidFill>
-                <a:latin typeface="Arial" panose="020B0604020202020204" pitchFamily="34" charset="0"/>
-                <a:cs typeface="Arial" panose="020B0604020202020204" pitchFamily="34" charset="0"/>
-              </a:rPr>
-              <a:t>Thực</a:t>
-            </a:r>
-            <a:r>
-              <a:rPr lang="en-US" sz="2400" b="1" dirty="0">
-                <a:solidFill>
-                  <a:srgbClr val="FF0000"/>
-                </a:solidFill>
-                <a:latin typeface="Arial" panose="020B0604020202020204" pitchFamily="34" charset="0"/>
-                <a:cs typeface="Arial" panose="020B0604020202020204" pitchFamily="34" charset="0"/>
-              </a:rPr>
-              <a:t> </a:t>
-            </a:r>
-            <a:r>
-              <a:rPr lang="en-US" sz="2400" b="1" dirty="0" err="1">
-                <a:solidFill>
-                  <a:srgbClr val="FF0000"/>
-                </a:solidFill>
-                <a:latin typeface="Arial" panose="020B0604020202020204" pitchFamily="34" charset="0"/>
-                <a:cs typeface="Arial" panose="020B0604020202020204" pitchFamily="34" charset="0"/>
-              </a:rPr>
-              <a:t>hành</a:t>
-            </a:r>
-            <a:endParaRPr lang="en-US" sz="2400" b="1" dirty="0">
-              <a:solidFill>
-                <a:srgbClr val="FF0000"/>
-              </a:solidFill>
-              <a:latin typeface="Arial" panose="020B0604020202020204" pitchFamily="34" charset="0"/>
-              <a:cs typeface="Arial" panose="020B0604020202020204" pitchFamily="34" charset="0"/>
-            </a:endParaRPr>
-          </a:p>
-          <a:p>
-            <a:endParaRPr lang="en-US" sz="2400" b="1" dirty="0">
-              <a:solidFill>
-                <a:srgbClr val="FF0000"/>
-              </a:solidFill>
-              <a:latin typeface="Arial" panose="020B0604020202020204" pitchFamily="34" charset="0"/>
-              <a:cs typeface="Arial" panose="020B0604020202020204" pitchFamily="34" charset="0"/>
-            </a:endParaRPr>
-          </a:p>
-          <a:p>
-            <a:endParaRPr lang="en-US" sz="2400" b="1" dirty="0">
-              <a:solidFill>
-                <a:srgbClr val="FF0000"/>
-              </a:solidFill>
-              <a:latin typeface="Arial" panose="020B0604020202020204" pitchFamily="34" charset="0"/>
-              <a:cs typeface="Arial" panose="020B0604020202020204" pitchFamily="34" charset="0"/>
-            </a:endParaRPr>
-          </a:p>
-        </p:txBody>
-      </p:sp>
-    </p:spTree>
-    <p:extLst>
-      <p:ext uri="{BB962C8B-B14F-4D97-AF65-F5344CB8AC3E}">
-        <p14:creationId xmlns:p14="http://schemas.microsoft.com/office/powerpoint/2010/main" val="2163069874"/>
       </p:ext>
     </p:extLst>
   </p:cSld>

</xml_diff>